<commit_message>
added new .csv && updated scripts
</commit_message>
<xml_diff>
--- a/3.documents/Demonstrations.pptx
+++ b/3.documents/Demonstrations.pptx
@@ -6,6 +6,8 @@
   </p:sldMasterIdLst>
   <p:sldIdLst>
     <p:sldId id="256" r:id="rId2"/>
+    <p:sldId id="257" r:id="rId3"/>
+    <p:sldId id="258" r:id="rId4"/>
   </p:sldIdLst>
   <p:sldSz cx="12192000" cy="6858000"/>
   <p:notesSz cx="6858000" cy="9144000"/>
@@ -104,6 +106,11 @@
       </a:defRPr>
     </a:lvl9pPr>
   </p:defaultTextStyle>
+  <p:extLst>
+    <p:ext uri="{EFAFB233-063F-42B5-8137-9DF3F51BA10A}">
+      <p15:sldGuideLst xmlns:p15="http://schemas.microsoft.com/office/powerpoint/2012/main"/>
+    </p:ext>
+  </p:extLst>
 </p:presentation>
 </file>
 
@@ -2964,6 +2971,83 @@
           <a:chExt cx="0" cy="0"/>
         </a:xfrm>
       </p:grpSpPr>
+      <p:sp>
+        <p:nvSpPr>
+          <p:cNvPr id="6" name="Title 5"/>
+          <p:cNvSpPr>
+            <a:spLocks noGrp="1"/>
+          </p:cNvSpPr>
+          <p:nvPr>
+            <p:ph type="title"/>
+          </p:nvPr>
+        </p:nvSpPr>
+        <p:spPr/>
+        <p:txBody>
+          <a:bodyPr/>
+          <a:lstStyle/>
+          <a:p>
+            <a:r>
+              <a:rPr lang="pt-PT" dirty="0" smtClean="0"/>
+              <a:t>DEMO1</a:t>
+            </a:r>
+            <a:endParaRPr lang="pt-PT" dirty="0"/>
+          </a:p>
+        </p:txBody>
+      </p:sp>
+      <p:pic>
+        <p:nvPicPr>
+          <p:cNvPr id="7" name="Picture 6"/>
+          <p:cNvPicPr>
+            <a:picLocks noChangeAspect="1"/>
+          </p:cNvPicPr>
+          <p:nvPr/>
+        </p:nvPicPr>
+        <p:blipFill>
+          <a:blip r:embed="rId2"/>
+          <a:stretch>
+            <a:fillRect/>
+          </a:stretch>
+        </p:blipFill>
+        <p:spPr>
+          <a:xfrm>
+            <a:off x="2293619" y="1966779"/>
+            <a:ext cx="7263743" cy="3930282"/>
+          </a:xfrm>
+          <a:prstGeom prst="rect">
+            <a:avLst/>
+          </a:prstGeom>
+        </p:spPr>
+      </p:pic>
+    </p:spTree>
+    <p:extLst>
+      <p:ext uri="{BB962C8B-B14F-4D97-AF65-F5344CB8AC3E}">
+        <p14:creationId xmlns:p14="http://schemas.microsoft.com/office/powerpoint/2010/main" val="424849101"/>
+      </p:ext>
+    </p:extLst>
+  </p:cSld>
+  <p:clrMapOvr>
+    <a:masterClrMapping/>
+  </p:clrMapOvr>
+</p:sld>
+</file>
+
+<file path=ppt/slides/slide2.xml><?xml version="1.0" encoding="utf-8"?>
+<p:sld xmlns:a="http://schemas.openxmlformats.org/drawingml/2006/main" xmlns:r="http://schemas.openxmlformats.org/officeDocument/2006/relationships" xmlns:p="http://schemas.openxmlformats.org/presentationml/2006/main">
+  <p:cSld>
+    <p:spTree>
+      <p:nvGrpSpPr>
+        <p:cNvPr id="1" name=""/>
+        <p:cNvGrpSpPr/>
+        <p:nvPr/>
+      </p:nvGrpSpPr>
+      <p:grpSpPr>
+        <a:xfrm>
+          <a:off x="0" y="0"/>
+          <a:ext cx="0" cy="0"/>
+          <a:chOff x="0" y="0"/>
+          <a:chExt cx="0" cy="0"/>
+        </a:xfrm>
+      </p:grpSpPr>
       <p:pic>
         <p:nvPicPr>
           <p:cNvPr id="5" name="Picture 4"/>
@@ -3005,7 +3089,7 @@
           <a:p>
             <a:r>
               <a:rPr lang="pt-PT" dirty="0" smtClean="0"/>
-              <a:t>DEMO1</a:t>
+              <a:t>DEMO2</a:t>
             </a:r>
             <a:endParaRPr lang="pt-PT" dirty="0"/>
           </a:p>
@@ -3014,7 +3098,84 @@
     </p:spTree>
     <p:extLst>
       <p:ext uri="{BB962C8B-B14F-4D97-AF65-F5344CB8AC3E}">
-        <p14:creationId xmlns:p14="http://schemas.microsoft.com/office/powerpoint/2010/main" val="424849101"/>
+        <p14:creationId xmlns:p14="http://schemas.microsoft.com/office/powerpoint/2010/main" val="2427140305"/>
+      </p:ext>
+    </p:extLst>
+  </p:cSld>
+  <p:clrMapOvr>
+    <a:masterClrMapping/>
+  </p:clrMapOvr>
+</p:sld>
+</file>
+
+<file path=ppt/slides/slide3.xml><?xml version="1.0" encoding="utf-8"?>
+<p:sld xmlns:a="http://schemas.openxmlformats.org/drawingml/2006/main" xmlns:r="http://schemas.openxmlformats.org/officeDocument/2006/relationships" xmlns:p="http://schemas.openxmlformats.org/presentationml/2006/main">
+  <p:cSld>
+    <p:spTree>
+      <p:nvGrpSpPr>
+        <p:cNvPr id="1" name=""/>
+        <p:cNvGrpSpPr/>
+        <p:nvPr/>
+      </p:nvGrpSpPr>
+      <p:grpSpPr>
+        <a:xfrm>
+          <a:off x="0" y="0"/>
+          <a:ext cx="0" cy="0"/>
+          <a:chOff x="0" y="0"/>
+          <a:chExt cx="0" cy="0"/>
+        </a:xfrm>
+      </p:grpSpPr>
+      <p:sp>
+        <p:nvSpPr>
+          <p:cNvPr id="6" name="Title 5"/>
+          <p:cNvSpPr>
+            <a:spLocks noGrp="1"/>
+          </p:cNvSpPr>
+          <p:nvPr>
+            <p:ph type="title"/>
+          </p:nvPr>
+        </p:nvSpPr>
+        <p:spPr/>
+        <p:txBody>
+          <a:bodyPr/>
+          <a:lstStyle/>
+          <a:p>
+            <a:r>
+              <a:rPr lang="pt-PT" dirty="0" smtClean="0"/>
+              <a:t>DEMO3</a:t>
+            </a:r>
+            <a:endParaRPr lang="pt-PT" dirty="0"/>
+          </a:p>
+        </p:txBody>
+      </p:sp>
+      <p:pic>
+        <p:nvPicPr>
+          <p:cNvPr id="2" name="Picture 1"/>
+          <p:cNvPicPr>
+            <a:picLocks noChangeAspect="1"/>
+          </p:cNvPicPr>
+          <p:nvPr/>
+        </p:nvPicPr>
+        <p:blipFill>
+          <a:blip r:embed="rId2"/>
+          <a:stretch>
+            <a:fillRect/>
+          </a:stretch>
+        </p:blipFill>
+        <p:spPr>
+          <a:xfrm>
+            <a:off x="1565909" y="2017124"/>
+            <a:ext cx="9060181" cy="3920270"/>
+          </a:xfrm>
+          <a:prstGeom prst="rect">
+            <a:avLst/>
+          </a:prstGeom>
+        </p:spPr>
+      </p:pic>
+    </p:spTree>
+    <p:extLst>
+      <p:ext uri="{BB962C8B-B14F-4D97-AF65-F5344CB8AC3E}">
+        <p14:creationId xmlns:p14="http://schemas.microsoft.com/office/powerpoint/2010/main" val="3080996399"/>
       </p:ext>
     </p:extLst>
   </p:cSld>

</xml_diff>

<commit_message>
Major revision (new csv, updated scripts and README)
</commit_message>
<xml_diff>
--- a/3.documents/Demonstrations.pptx
+++ b/3.documents/Demonstrations.pptx
@@ -4,6 +4,9 @@
   <p:sldMasterIdLst>
     <p:sldMasterId id="2147483648" r:id="rId1"/>
   </p:sldMasterIdLst>
+  <p:notesMasterIdLst>
+    <p:notesMasterId r:id="rId5"/>
+  </p:notesMasterIdLst>
   <p:sldIdLst>
     <p:sldId id="256" r:id="rId2"/>
     <p:sldId id="257" r:id="rId3"/>
@@ -114,6 +117,448 @@
 </p:presentation>
 </file>
 
+<file path=ppt/notesMasters/notesMaster1.xml><?xml version="1.0" encoding="utf-8"?>
+<p:notesMaster xmlns:a="http://schemas.openxmlformats.org/drawingml/2006/main" xmlns:r="http://schemas.openxmlformats.org/officeDocument/2006/relationships" xmlns:p="http://schemas.openxmlformats.org/presentationml/2006/main">
+  <p:cSld>
+    <p:bg>
+      <p:bgRef idx="1001">
+        <a:schemeClr val="bg1"/>
+      </p:bgRef>
+    </p:bg>
+    <p:spTree>
+      <p:nvGrpSpPr>
+        <p:cNvPr id="1" name=""/>
+        <p:cNvGrpSpPr/>
+        <p:nvPr/>
+      </p:nvGrpSpPr>
+      <p:grpSpPr>
+        <a:xfrm>
+          <a:off x="0" y="0"/>
+          <a:ext cx="0" cy="0"/>
+          <a:chOff x="0" y="0"/>
+          <a:chExt cx="0" cy="0"/>
+        </a:xfrm>
+      </p:grpSpPr>
+      <p:sp>
+        <p:nvSpPr>
+          <p:cNvPr id="2" name="Header Placeholder 1"/>
+          <p:cNvSpPr>
+            <a:spLocks noGrp="1"/>
+          </p:cNvSpPr>
+          <p:nvPr>
+            <p:ph type="hdr" sz="quarter"/>
+          </p:nvPr>
+        </p:nvSpPr>
+        <p:spPr>
+          <a:xfrm>
+            <a:off x="0" y="0"/>
+            <a:ext cx="2971800" cy="458788"/>
+          </a:xfrm>
+          <a:prstGeom prst="rect">
+            <a:avLst/>
+          </a:prstGeom>
+        </p:spPr>
+        <p:txBody>
+          <a:bodyPr vert="horz" lIns="91440" tIns="45720" rIns="91440" bIns="45720" rtlCol="0"/>
+          <a:lstStyle>
+            <a:lvl1pPr algn="l">
+              <a:defRPr sz="1200"/>
+            </a:lvl1pPr>
+          </a:lstStyle>
+          <a:p>
+            <a:endParaRPr lang="pt-PT"/>
+          </a:p>
+        </p:txBody>
+      </p:sp>
+      <p:sp>
+        <p:nvSpPr>
+          <p:cNvPr id="3" name="Date Placeholder 2"/>
+          <p:cNvSpPr>
+            <a:spLocks noGrp="1"/>
+          </p:cNvSpPr>
+          <p:nvPr>
+            <p:ph type="dt" idx="1"/>
+          </p:nvPr>
+        </p:nvSpPr>
+        <p:spPr>
+          <a:xfrm>
+            <a:off x="3884613" y="0"/>
+            <a:ext cx="2971800" cy="458788"/>
+          </a:xfrm>
+          <a:prstGeom prst="rect">
+            <a:avLst/>
+          </a:prstGeom>
+        </p:spPr>
+        <p:txBody>
+          <a:bodyPr vert="horz" lIns="91440" tIns="45720" rIns="91440" bIns="45720" rtlCol="0"/>
+          <a:lstStyle>
+            <a:lvl1pPr algn="r">
+              <a:defRPr sz="1200"/>
+            </a:lvl1pPr>
+          </a:lstStyle>
+          <a:p>
+            <a:fld id="{209AFF13-D57B-49C4-A1B6-ABD758E6069C}" type="datetimeFigureOut">
+              <a:rPr lang="pt-PT" smtClean="0"/>
+              <a:t>31/08/2021</a:t>
+            </a:fld>
+            <a:endParaRPr lang="pt-PT"/>
+          </a:p>
+        </p:txBody>
+      </p:sp>
+      <p:sp>
+        <p:nvSpPr>
+          <p:cNvPr id="4" name="Slide Image Placeholder 3"/>
+          <p:cNvSpPr>
+            <a:spLocks noGrp="1" noRot="1" noChangeAspect="1"/>
+          </p:cNvSpPr>
+          <p:nvPr>
+            <p:ph type="sldImg" idx="2"/>
+          </p:nvPr>
+        </p:nvSpPr>
+        <p:spPr>
+          <a:xfrm>
+            <a:off x="685800" y="1143000"/>
+            <a:ext cx="5486400" cy="3086100"/>
+          </a:xfrm>
+          <a:prstGeom prst="rect">
+            <a:avLst/>
+          </a:prstGeom>
+          <a:noFill/>
+          <a:ln w="12700">
+            <a:solidFill>
+              <a:prstClr val="black"/>
+            </a:solidFill>
+          </a:ln>
+        </p:spPr>
+        <p:txBody>
+          <a:bodyPr vert="horz" lIns="91440" tIns="45720" rIns="91440" bIns="45720" rtlCol="0" anchor="ctr"/>
+          <a:lstStyle/>
+          <a:p>
+            <a:endParaRPr lang="pt-PT"/>
+          </a:p>
+        </p:txBody>
+      </p:sp>
+      <p:sp>
+        <p:nvSpPr>
+          <p:cNvPr id="5" name="Notes Placeholder 4"/>
+          <p:cNvSpPr>
+            <a:spLocks noGrp="1"/>
+          </p:cNvSpPr>
+          <p:nvPr>
+            <p:ph type="body" sz="quarter" idx="3"/>
+          </p:nvPr>
+        </p:nvSpPr>
+        <p:spPr>
+          <a:xfrm>
+            <a:off x="685800" y="4400550"/>
+            <a:ext cx="5486400" cy="3600450"/>
+          </a:xfrm>
+          <a:prstGeom prst="rect">
+            <a:avLst/>
+          </a:prstGeom>
+        </p:spPr>
+        <p:txBody>
+          <a:bodyPr vert="horz" lIns="91440" tIns="45720" rIns="91440" bIns="45720" rtlCol="0"/>
+          <a:lstStyle/>
+          <a:p>
+            <a:pPr lvl="0"/>
+            <a:r>
+              <a:rPr lang="en-US" smtClean="0"/>
+              <a:t>Edit Master text styles</a:t>
+            </a:r>
+          </a:p>
+          <a:p>
+            <a:pPr lvl="1"/>
+            <a:r>
+              <a:rPr lang="en-US" smtClean="0"/>
+              <a:t>Second level</a:t>
+            </a:r>
+          </a:p>
+          <a:p>
+            <a:pPr lvl="2"/>
+            <a:r>
+              <a:rPr lang="en-US" smtClean="0"/>
+              <a:t>Third level</a:t>
+            </a:r>
+          </a:p>
+          <a:p>
+            <a:pPr lvl="3"/>
+            <a:r>
+              <a:rPr lang="en-US" smtClean="0"/>
+              <a:t>Fourth level</a:t>
+            </a:r>
+          </a:p>
+          <a:p>
+            <a:pPr lvl="4"/>
+            <a:r>
+              <a:rPr lang="en-US" smtClean="0"/>
+              <a:t>Fifth level</a:t>
+            </a:r>
+            <a:endParaRPr lang="pt-PT"/>
+          </a:p>
+        </p:txBody>
+      </p:sp>
+      <p:sp>
+        <p:nvSpPr>
+          <p:cNvPr id="6" name="Footer Placeholder 5"/>
+          <p:cNvSpPr>
+            <a:spLocks noGrp="1"/>
+          </p:cNvSpPr>
+          <p:nvPr>
+            <p:ph type="ftr" sz="quarter" idx="4"/>
+          </p:nvPr>
+        </p:nvSpPr>
+        <p:spPr>
+          <a:xfrm>
+            <a:off x="0" y="8685213"/>
+            <a:ext cx="2971800" cy="458787"/>
+          </a:xfrm>
+          <a:prstGeom prst="rect">
+            <a:avLst/>
+          </a:prstGeom>
+        </p:spPr>
+        <p:txBody>
+          <a:bodyPr vert="horz" lIns="91440" tIns="45720" rIns="91440" bIns="45720" rtlCol="0" anchor="b"/>
+          <a:lstStyle>
+            <a:lvl1pPr algn="l">
+              <a:defRPr sz="1200"/>
+            </a:lvl1pPr>
+          </a:lstStyle>
+          <a:p>
+            <a:endParaRPr lang="pt-PT"/>
+          </a:p>
+        </p:txBody>
+      </p:sp>
+      <p:sp>
+        <p:nvSpPr>
+          <p:cNvPr id="7" name="Slide Number Placeholder 6"/>
+          <p:cNvSpPr>
+            <a:spLocks noGrp="1"/>
+          </p:cNvSpPr>
+          <p:nvPr>
+            <p:ph type="sldNum" sz="quarter" idx="5"/>
+          </p:nvPr>
+        </p:nvSpPr>
+        <p:spPr>
+          <a:xfrm>
+            <a:off x="3884613" y="8685213"/>
+            <a:ext cx="2971800" cy="458787"/>
+          </a:xfrm>
+          <a:prstGeom prst="rect">
+            <a:avLst/>
+          </a:prstGeom>
+        </p:spPr>
+        <p:txBody>
+          <a:bodyPr vert="horz" lIns="91440" tIns="45720" rIns="91440" bIns="45720" rtlCol="0" anchor="b"/>
+          <a:lstStyle>
+            <a:lvl1pPr algn="r">
+              <a:defRPr sz="1200"/>
+            </a:lvl1pPr>
+          </a:lstStyle>
+          <a:p>
+            <a:fld id="{525BF663-0CF6-4152-93BA-E6213EA844DF}" type="slidenum">
+              <a:rPr lang="pt-PT" smtClean="0"/>
+              <a:t>‹#›</a:t>
+            </a:fld>
+            <a:endParaRPr lang="pt-PT"/>
+          </a:p>
+        </p:txBody>
+      </p:sp>
+    </p:spTree>
+    <p:extLst>
+      <p:ext uri="{BB962C8B-B14F-4D97-AF65-F5344CB8AC3E}">
+        <p14:creationId xmlns:p14="http://schemas.microsoft.com/office/powerpoint/2010/main" val="3775916583"/>
+      </p:ext>
+    </p:extLst>
+  </p:cSld>
+  <p:clrMap bg1="lt1" tx1="dk1" bg2="lt2" tx2="dk2" accent1="accent1" accent2="accent2" accent3="accent3" accent4="accent4" accent5="accent5" accent6="accent6" hlink="hlink" folHlink="folHlink"/>
+  <p:notesStyle>
+    <a:lvl1pPr marL="0" algn="l" defTabSz="914400" rtl="0" eaLnBrk="1" latinLnBrk="0" hangingPunct="1">
+      <a:defRPr sz="1200" kern="1200">
+        <a:solidFill>
+          <a:schemeClr val="tx1"/>
+        </a:solidFill>
+        <a:latin typeface="+mn-lt"/>
+        <a:ea typeface="+mn-ea"/>
+        <a:cs typeface="+mn-cs"/>
+      </a:defRPr>
+    </a:lvl1pPr>
+    <a:lvl2pPr marL="457200" algn="l" defTabSz="914400" rtl="0" eaLnBrk="1" latinLnBrk="0" hangingPunct="1">
+      <a:defRPr sz="1200" kern="1200">
+        <a:solidFill>
+          <a:schemeClr val="tx1"/>
+        </a:solidFill>
+        <a:latin typeface="+mn-lt"/>
+        <a:ea typeface="+mn-ea"/>
+        <a:cs typeface="+mn-cs"/>
+      </a:defRPr>
+    </a:lvl2pPr>
+    <a:lvl3pPr marL="914400" algn="l" defTabSz="914400" rtl="0" eaLnBrk="1" latinLnBrk="0" hangingPunct="1">
+      <a:defRPr sz="1200" kern="1200">
+        <a:solidFill>
+          <a:schemeClr val="tx1"/>
+        </a:solidFill>
+        <a:latin typeface="+mn-lt"/>
+        <a:ea typeface="+mn-ea"/>
+        <a:cs typeface="+mn-cs"/>
+      </a:defRPr>
+    </a:lvl3pPr>
+    <a:lvl4pPr marL="1371600" algn="l" defTabSz="914400" rtl="0" eaLnBrk="1" latinLnBrk="0" hangingPunct="1">
+      <a:defRPr sz="1200" kern="1200">
+        <a:solidFill>
+          <a:schemeClr val="tx1"/>
+        </a:solidFill>
+        <a:latin typeface="+mn-lt"/>
+        <a:ea typeface="+mn-ea"/>
+        <a:cs typeface="+mn-cs"/>
+      </a:defRPr>
+    </a:lvl4pPr>
+    <a:lvl5pPr marL="1828800" algn="l" defTabSz="914400" rtl="0" eaLnBrk="1" latinLnBrk="0" hangingPunct="1">
+      <a:defRPr sz="1200" kern="1200">
+        <a:solidFill>
+          <a:schemeClr val="tx1"/>
+        </a:solidFill>
+        <a:latin typeface="+mn-lt"/>
+        <a:ea typeface="+mn-ea"/>
+        <a:cs typeface="+mn-cs"/>
+      </a:defRPr>
+    </a:lvl5pPr>
+    <a:lvl6pPr marL="2286000" algn="l" defTabSz="914400" rtl="0" eaLnBrk="1" latinLnBrk="0" hangingPunct="1">
+      <a:defRPr sz="1200" kern="1200">
+        <a:solidFill>
+          <a:schemeClr val="tx1"/>
+        </a:solidFill>
+        <a:latin typeface="+mn-lt"/>
+        <a:ea typeface="+mn-ea"/>
+        <a:cs typeface="+mn-cs"/>
+      </a:defRPr>
+    </a:lvl6pPr>
+    <a:lvl7pPr marL="2743200" algn="l" defTabSz="914400" rtl="0" eaLnBrk="1" latinLnBrk="0" hangingPunct="1">
+      <a:defRPr sz="1200" kern="1200">
+        <a:solidFill>
+          <a:schemeClr val="tx1"/>
+        </a:solidFill>
+        <a:latin typeface="+mn-lt"/>
+        <a:ea typeface="+mn-ea"/>
+        <a:cs typeface="+mn-cs"/>
+      </a:defRPr>
+    </a:lvl7pPr>
+    <a:lvl8pPr marL="3200400" algn="l" defTabSz="914400" rtl="0" eaLnBrk="1" latinLnBrk="0" hangingPunct="1">
+      <a:defRPr sz="1200" kern="1200">
+        <a:solidFill>
+          <a:schemeClr val="tx1"/>
+        </a:solidFill>
+        <a:latin typeface="+mn-lt"/>
+        <a:ea typeface="+mn-ea"/>
+        <a:cs typeface="+mn-cs"/>
+      </a:defRPr>
+    </a:lvl8pPr>
+    <a:lvl9pPr marL="3657600" algn="l" defTabSz="914400" rtl="0" eaLnBrk="1" latinLnBrk="0" hangingPunct="1">
+      <a:defRPr sz="1200" kern="1200">
+        <a:solidFill>
+          <a:schemeClr val="tx1"/>
+        </a:solidFill>
+        <a:latin typeface="+mn-lt"/>
+        <a:ea typeface="+mn-ea"/>
+        <a:cs typeface="+mn-cs"/>
+      </a:defRPr>
+    </a:lvl9pPr>
+  </p:notesStyle>
+</p:notesMaster>
+</file>
+
+<file path=ppt/notesSlides/notesSlide1.xml><?xml version="1.0" encoding="utf-8"?>
+<p:notes xmlns:a="http://schemas.openxmlformats.org/drawingml/2006/main" xmlns:r="http://schemas.openxmlformats.org/officeDocument/2006/relationships" xmlns:p="http://schemas.openxmlformats.org/presentationml/2006/main">
+  <p:cSld>
+    <p:spTree>
+      <p:nvGrpSpPr>
+        <p:cNvPr id="1" name=""/>
+        <p:cNvGrpSpPr/>
+        <p:nvPr/>
+      </p:nvGrpSpPr>
+      <p:grpSpPr>
+        <a:xfrm>
+          <a:off x="0" y="0"/>
+          <a:ext cx="0" cy="0"/>
+          <a:chOff x="0" y="0"/>
+          <a:chExt cx="0" cy="0"/>
+        </a:xfrm>
+      </p:grpSpPr>
+      <p:sp>
+        <p:nvSpPr>
+          <p:cNvPr id="2" name="Slide Image Placeholder 1"/>
+          <p:cNvSpPr>
+            <a:spLocks noGrp="1" noRot="1" noChangeAspect="1"/>
+          </p:cNvSpPr>
+          <p:nvPr>
+            <p:ph type="sldImg"/>
+          </p:nvPr>
+        </p:nvSpPr>
+        <p:spPr/>
+      </p:sp>
+      <p:sp>
+        <p:nvSpPr>
+          <p:cNvPr id="3" name="Notes Placeholder 2"/>
+          <p:cNvSpPr>
+            <a:spLocks noGrp="1"/>
+          </p:cNvSpPr>
+          <p:nvPr>
+            <p:ph type="body" idx="1"/>
+          </p:nvPr>
+        </p:nvSpPr>
+        <p:spPr/>
+        <p:txBody>
+          <a:bodyPr/>
+          <a:lstStyle/>
+          <a:p>
+            <a:r>
+              <a:rPr lang="pt-PT" dirty="0" smtClean="0"/>
+              <a:t>Manter</a:t>
+            </a:r>
+            <a:r>
+              <a:rPr lang="pt-PT" baseline="0" dirty="0" smtClean="0"/>
+              <a:t> measurement DEMO 1 e 2</a:t>
+            </a:r>
+            <a:endParaRPr lang="pt-PT" dirty="0"/>
+          </a:p>
+        </p:txBody>
+      </p:sp>
+      <p:sp>
+        <p:nvSpPr>
+          <p:cNvPr id="4" name="Slide Number Placeholder 3"/>
+          <p:cNvSpPr>
+            <a:spLocks noGrp="1"/>
+          </p:cNvSpPr>
+          <p:nvPr>
+            <p:ph type="sldNum" sz="quarter" idx="10"/>
+          </p:nvPr>
+        </p:nvSpPr>
+        <p:spPr/>
+        <p:txBody>
+          <a:bodyPr/>
+          <a:lstStyle/>
+          <a:p>
+            <a:fld id="{525BF663-0CF6-4152-93BA-E6213EA844DF}" type="slidenum">
+              <a:rPr lang="pt-PT" smtClean="0"/>
+              <a:t>3</a:t>
+            </a:fld>
+            <a:endParaRPr lang="pt-PT"/>
+          </a:p>
+        </p:txBody>
+      </p:sp>
+    </p:spTree>
+    <p:extLst>
+      <p:ext uri="{BB962C8B-B14F-4D97-AF65-F5344CB8AC3E}">
+        <p14:creationId xmlns:p14="http://schemas.microsoft.com/office/powerpoint/2010/main" val="2729822252"/>
+      </p:ext>
+    </p:extLst>
+  </p:cSld>
+  <p:clrMapOvr>
+    <a:masterClrMapping/>
+  </p:clrMapOvr>
+</p:notes>
+</file>
+
 <file path=ppt/slideLayouts/slideLayout1.xml><?xml version="1.0" encoding="utf-8"?>
 <p:sldLayout xmlns:a="http://schemas.openxmlformats.org/drawingml/2006/main" xmlns:r="http://schemas.openxmlformats.org/officeDocument/2006/relationships" xmlns:p="http://schemas.openxmlformats.org/presentationml/2006/main" type="title" preserve="1">
   <p:cSld name="Title Slide">
@@ -245,7 +690,7 @@
           <a:p>
             <a:fld id="{8635A13E-CC1A-4EBE-9635-2354845B9288}" type="datetimeFigureOut">
               <a:rPr lang="pt-PT" smtClean="0"/>
-              <a:t>30/08/2021</a:t>
+              <a:t>31/08/2021</a:t>
             </a:fld>
             <a:endParaRPr lang="pt-PT"/>
           </a:p>
@@ -415,7 +860,7 @@
           <a:p>
             <a:fld id="{8635A13E-CC1A-4EBE-9635-2354845B9288}" type="datetimeFigureOut">
               <a:rPr lang="pt-PT" smtClean="0"/>
-              <a:t>30/08/2021</a:t>
+              <a:t>31/08/2021</a:t>
             </a:fld>
             <a:endParaRPr lang="pt-PT"/>
           </a:p>
@@ -595,7 +1040,7 @@
           <a:p>
             <a:fld id="{8635A13E-CC1A-4EBE-9635-2354845B9288}" type="datetimeFigureOut">
               <a:rPr lang="pt-PT" smtClean="0"/>
-              <a:t>30/08/2021</a:t>
+              <a:t>31/08/2021</a:t>
             </a:fld>
             <a:endParaRPr lang="pt-PT"/>
           </a:p>
@@ -765,7 +1210,7 @@
           <a:p>
             <a:fld id="{8635A13E-CC1A-4EBE-9635-2354845B9288}" type="datetimeFigureOut">
               <a:rPr lang="pt-PT" smtClean="0"/>
-              <a:t>30/08/2021</a:t>
+              <a:t>31/08/2021</a:t>
             </a:fld>
             <a:endParaRPr lang="pt-PT"/>
           </a:p>
@@ -1011,7 +1456,7 @@
           <a:p>
             <a:fld id="{8635A13E-CC1A-4EBE-9635-2354845B9288}" type="datetimeFigureOut">
               <a:rPr lang="pt-PT" smtClean="0"/>
-              <a:t>30/08/2021</a:t>
+              <a:t>31/08/2021</a:t>
             </a:fld>
             <a:endParaRPr lang="pt-PT"/>
           </a:p>
@@ -1243,7 +1688,7 @@
           <a:p>
             <a:fld id="{8635A13E-CC1A-4EBE-9635-2354845B9288}" type="datetimeFigureOut">
               <a:rPr lang="pt-PT" smtClean="0"/>
-              <a:t>30/08/2021</a:t>
+              <a:t>31/08/2021</a:t>
             </a:fld>
             <a:endParaRPr lang="pt-PT"/>
           </a:p>
@@ -1610,7 +2055,7 @@
           <a:p>
             <a:fld id="{8635A13E-CC1A-4EBE-9635-2354845B9288}" type="datetimeFigureOut">
               <a:rPr lang="pt-PT" smtClean="0"/>
-              <a:t>30/08/2021</a:t>
+              <a:t>31/08/2021</a:t>
             </a:fld>
             <a:endParaRPr lang="pt-PT"/>
           </a:p>
@@ -1728,7 +2173,7 @@
           <a:p>
             <a:fld id="{8635A13E-CC1A-4EBE-9635-2354845B9288}" type="datetimeFigureOut">
               <a:rPr lang="pt-PT" smtClean="0"/>
-              <a:t>30/08/2021</a:t>
+              <a:t>31/08/2021</a:t>
             </a:fld>
             <a:endParaRPr lang="pt-PT"/>
           </a:p>
@@ -1823,7 +2268,7 @@
           <a:p>
             <a:fld id="{8635A13E-CC1A-4EBE-9635-2354845B9288}" type="datetimeFigureOut">
               <a:rPr lang="pt-PT" smtClean="0"/>
-              <a:t>30/08/2021</a:t>
+              <a:t>31/08/2021</a:t>
             </a:fld>
             <a:endParaRPr lang="pt-PT"/>
           </a:p>
@@ -2100,7 +2545,7 @@
           <a:p>
             <a:fld id="{8635A13E-CC1A-4EBE-9635-2354845B9288}" type="datetimeFigureOut">
               <a:rPr lang="pt-PT" smtClean="0"/>
-              <a:t>30/08/2021</a:t>
+              <a:t>31/08/2021</a:t>
             </a:fld>
             <a:endParaRPr lang="pt-PT"/>
           </a:p>
@@ -2353,7 +2798,7 @@
           <a:p>
             <a:fld id="{8635A13E-CC1A-4EBE-9635-2354845B9288}" type="datetimeFigureOut">
               <a:rPr lang="pt-PT" smtClean="0"/>
-              <a:t>30/08/2021</a:t>
+              <a:t>31/08/2021</a:t>
             </a:fld>
             <a:endParaRPr lang="pt-PT"/>
           </a:p>
@@ -2566,7 +3011,7 @@
           <a:p>
             <a:fld id="{8635A13E-CC1A-4EBE-9635-2354845B9288}" type="datetimeFigureOut">
               <a:rPr lang="pt-PT" smtClean="0"/>
-              <a:t>30/08/2021</a:t>
+              <a:t>31/08/2021</a:t>
             </a:fld>
             <a:endParaRPr lang="pt-PT"/>
           </a:p>
@@ -3157,7 +3602,7 @@
           <p:nvPr/>
         </p:nvPicPr>
         <p:blipFill>
-          <a:blip r:embed="rId2"/>
+          <a:blip r:embed="rId3"/>
           <a:stretch>
             <a:fillRect/>
           </a:stretch>
@@ -3444,4 +3889,265 @@
     </a:ext>
   </a:extLst>
 </a:theme>
+</file>
+
+<file path=ppt/theme/theme2.xml><?xml version="1.0" encoding="utf-8"?>
+<a:theme xmlns:a="http://schemas.openxmlformats.org/drawingml/2006/main" name="Office Theme">
+  <a:themeElements>
+    <a:clrScheme name="Office">
+      <a:dk1>
+        <a:sysClr val="windowText" lastClr="000000"/>
+      </a:dk1>
+      <a:lt1>
+        <a:sysClr val="window" lastClr="FFFFFF"/>
+      </a:lt1>
+      <a:dk2>
+        <a:srgbClr val="44546A"/>
+      </a:dk2>
+      <a:lt2>
+        <a:srgbClr val="E7E6E6"/>
+      </a:lt2>
+      <a:accent1>
+        <a:srgbClr val="5B9BD5"/>
+      </a:accent1>
+      <a:accent2>
+        <a:srgbClr val="ED7D31"/>
+      </a:accent2>
+      <a:accent3>
+        <a:srgbClr val="A5A5A5"/>
+      </a:accent3>
+      <a:accent4>
+        <a:srgbClr val="FFC000"/>
+      </a:accent4>
+      <a:accent5>
+        <a:srgbClr val="4472C4"/>
+      </a:accent5>
+      <a:accent6>
+        <a:srgbClr val="70AD47"/>
+      </a:accent6>
+      <a:hlink>
+        <a:srgbClr val="0563C1"/>
+      </a:hlink>
+      <a:folHlink>
+        <a:srgbClr val="954F72"/>
+      </a:folHlink>
+    </a:clrScheme>
+    <a:fontScheme name="Office">
+      <a:majorFont>
+        <a:latin typeface="Calibri Light" panose="020F0302020204030204"/>
+        <a:ea typeface=""/>
+        <a:cs typeface=""/>
+        <a:font script="Jpan" typeface="游ゴシック Light"/>
+        <a:font script="Hang" typeface="맑은 고딕"/>
+        <a:font script="Hans" typeface="等线 Light"/>
+        <a:font script="Hant" typeface="新細明體"/>
+        <a:font script="Arab" typeface="Times New Roman"/>
+        <a:font script="Hebr" typeface="Times New Roman"/>
+        <a:font script="Thai" typeface="Angsana New"/>
+        <a:font script="Ethi" typeface="Nyala"/>
+        <a:font script="Beng" typeface="Vrinda"/>
+        <a:font script="Gujr" typeface="Shruti"/>
+        <a:font script="Khmr" typeface="MoolBoran"/>
+        <a:font script="Knda" typeface="Tunga"/>
+        <a:font script="Guru" typeface="Raavi"/>
+        <a:font script="Cans" typeface="Euphemia"/>
+        <a:font script="Cher" typeface="Plantagenet Cherokee"/>
+        <a:font script="Yiii" typeface="Microsoft Yi Baiti"/>
+        <a:font script="Tibt" typeface="Microsoft Himalaya"/>
+        <a:font script="Thaa" typeface="MV Boli"/>
+        <a:font script="Deva" typeface="Mangal"/>
+        <a:font script="Telu" typeface="Gautami"/>
+        <a:font script="Taml" typeface="Latha"/>
+        <a:font script="Syrc" typeface="Estrangelo Edessa"/>
+        <a:font script="Orya" typeface="Kalinga"/>
+        <a:font script="Mlym" typeface="Kartika"/>
+        <a:font script="Laoo" typeface="DokChampa"/>
+        <a:font script="Sinh" typeface="Iskoola Pota"/>
+        <a:font script="Mong" typeface="Mongolian Baiti"/>
+        <a:font script="Viet" typeface="Times New Roman"/>
+        <a:font script="Uigh" typeface="Microsoft Uighur"/>
+        <a:font script="Geor" typeface="Sylfaen"/>
+      </a:majorFont>
+      <a:minorFont>
+        <a:latin typeface="Calibri" panose="020F0502020204030204"/>
+        <a:ea typeface=""/>
+        <a:cs typeface=""/>
+        <a:font script="Jpan" typeface="游ゴシック"/>
+        <a:font script="Hang" typeface="맑은 고딕"/>
+        <a:font script="Hans" typeface="等线"/>
+        <a:font script="Hant" typeface="新細明體"/>
+        <a:font script="Arab" typeface="Arial"/>
+        <a:font script="Hebr" typeface="Arial"/>
+        <a:font script="Thai" typeface="Cordia New"/>
+        <a:font script="Ethi" typeface="Nyala"/>
+        <a:font script="Beng" typeface="Vrinda"/>
+        <a:font script="Gujr" typeface="Shruti"/>
+        <a:font script="Khmr" typeface="DaunPenh"/>
+        <a:font script="Knda" typeface="Tunga"/>
+        <a:font script="Guru" typeface="Raavi"/>
+        <a:font script="Cans" typeface="Euphemia"/>
+        <a:font script="Cher" typeface="Plantagenet Cherokee"/>
+        <a:font script="Yiii" typeface="Microsoft Yi Baiti"/>
+        <a:font script="Tibt" typeface="Microsoft Himalaya"/>
+        <a:font script="Thaa" typeface="MV Boli"/>
+        <a:font script="Deva" typeface="Mangal"/>
+        <a:font script="Telu" typeface="Gautami"/>
+        <a:font script="Taml" typeface="Latha"/>
+        <a:font script="Syrc" typeface="Estrangelo Edessa"/>
+        <a:font script="Orya" typeface="Kalinga"/>
+        <a:font script="Mlym" typeface="Kartika"/>
+        <a:font script="Laoo" typeface="DokChampa"/>
+        <a:font script="Sinh" typeface="Iskoola Pota"/>
+        <a:font script="Mong" typeface="Mongolian Baiti"/>
+        <a:font script="Viet" typeface="Arial"/>
+        <a:font script="Uigh" typeface="Microsoft Uighur"/>
+        <a:font script="Geor" typeface="Sylfaen"/>
+      </a:minorFont>
+    </a:fontScheme>
+    <a:fmtScheme name="Office">
+      <a:fillStyleLst>
+        <a:solidFill>
+          <a:schemeClr val="phClr"/>
+        </a:solidFill>
+        <a:gradFill rotWithShape="1">
+          <a:gsLst>
+            <a:gs pos="0">
+              <a:schemeClr val="phClr">
+                <a:lumMod val="110000"/>
+                <a:satMod val="105000"/>
+                <a:tint val="67000"/>
+              </a:schemeClr>
+            </a:gs>
+            <a:gs pos="50000">
+              <a:schemeClr val="phClr">
+                <a:lumMod val="105000"/>
+                <a:satMod val="103000"/>
+                <a:tint val="73000"/>
+              </a:schemeClr>
+            </a:gs>
+            <a:gs pos="100000">
+              <a:schemeClr val="phClr">
+                <a:lumMod val="105000"/>
+                <a:satMod val="109000"/>
+                <a:tint val="81000"/>
+              </a:schemeClr>
+            </a:gs>
+          </a:gsLst>
+          <a:lin ang="5400000" scaled="0"/>
+        </a:gradFill>
+        <a:gradFill rotWithShape="1">
+          <a:gsLst>
+            <a:gs pos="0">
+              <a:schemeClr val="phClr">
+                <a:satMod val="103000"/>
+                <a:lumMod val="102000"/>
+                <a:tint val="94000"/>
+              </a:schemeClr>
+            </a:gs>
+            <a:gs pos="50000">
+              <a:schemeClr val="phClr">
+                <a:satMod val="110000"/>
+                <a:lumMod val="100000"/>
+                <a:shade val="100000"/>
+              </a:schemeClr>
+            </a:gs>
+            <a:gs pos="100000">
+              <a:schemeClr val="phClr">
+                <a:lumMod val="99000"/>
+                <a:satMod val="120000"/>
+                <a:shade val="78000"/>
+              </a:schemeClr>
+            </a:gs>
+          </a:gsLst>
+          <a:lin ang="5400000" scaled="0"/>
+        </a:gradFill>
+      </a:fillStyleLst>
+      <a:lnStyleLst>
+        <a:ln w="6350" cap="flat" cmpd="sng" algn="ctr">
+          <a:solidFill>
+            <a:schemeClr val="phClr"/>
+          </a:solidFill>
+          <a:prstDash val="solid"/>
+          <a:miter lim="800000"/>
+        </a:ln>
+        <a:ln w="12700" cap="flat" cmpd="sng" algn="ctr">
+          <a:solidFill>
+            <a:schemeClr val="phClr"/>
+          </a:solidFill>
+          <a:prstDash val="solid"/>
+          <a:miter lim="800000"/>
+        </a:ln>
+        <a:ln w="19050" cap="flat" cmpd="sng" algn="ctr">
+          <a:solidFill>
+            <a:schemeClr val="phClr"/>
+          </a:solidFill>
+          <a:prstDash val="solid"/>
+          <a:miter lim="800000"/>
+        </a:ln>
+      </a:lnStyleLst>
+      <a:effectStyleLst>
+        <a:effectStyle>
+          <a:effectLst/>
+        </a:effectStyle>
+        <a:effectStyle>
+          <a:effectLst/>
+        </a:effectStyle>
+        <a:effectStyle>
+          <a:effectLst>
+            <a:outerShdw blurRad="57150" dist="19050" dir="5400000" algn="ctr" rotWithShape="0">
+              <a:srgbClr val="000000">
+                <a:alpha val="63000"/>
+              </a:srgbClr>
+            </a:outerShdw>
+          </a:effectLst>
+        </a:effectStyle>
+      </a:effectStyleLst>
+      <a:bgFillStyleLst>
+        <a:solidFill>
+          <a:schemeClr val="phClr"/>
+        </a:solidFill>
+        <a:solidFill>
+          <a:schemeClr val="phClr">
+            <a:tint val="95000"/>
+            <a:satMod val="170000"/>
+          </a:schemeClr>
+        </a:solidFill>
+        <a:gradFill rotWithShape="1">
+          <a:gsLst>
+            <a:gs pos="0">
+              <a:schemeClr val="phClr">
+                <a:tint val="93000"/>
+                <a:satMod val="150000"/>
+                <a:shade val="98000"/>
+                <a:lumMod val="102000"/>
+              </a:schemeClr>
+            </a:gs>
+            <a:gs pos="50000">
+              <a:schemeClr val="phClr">
+                <a:tint val="98000"/>
+                <a:satMod val="130000"/>
+                <a:shade val="90000"/>
+                <a:lumMod val="103000"/>
+              </a:schemeClr>
+            </a:gs>
+            <a:gs pos="100000">
+              <a:schemeClr val="phClr">
+                <a:shade val="63000"/>
+                <a:satMod val="120000"/>
+              </a:schemeClr>
+            </a:gs>
+          </a:gsLst>
+          <a:lin ang="5400000" scaled="0"/>
+        </a:gradFill>
+      </a:bgFillStyleLst>
+    </a:fmtScheme>
+  </a:themeElements>
+  <a:objectDefaults/>
+  <a:extraClrSchemeLst/>
+  <a:extLst>
+    <a:ext uri="{05A4C25C-085E-4340-85A3-A5531E510DB2}">
+      <thm15:themeFamily xmlns:thm15="http://schemas.microsoft.com/office/thememl/2012/main" name="Office Theme" id="{62F939B6-93AF-4DB8-9C6B-D6C7DFDC589F}" vid="{4A3C46E8-61CC-4603-A589-7422A47A8E4A}"/>
+    </a:ext>
+  </a:extLst>
+</a:theme>
 </file>
</xml_diff>

<commit_message>
updated template and documentation
</commit_message>
<xml_diff>
--- a/3.documents/Demonstrations.pptx
+++ b/3.documents/Demonstrations.pptx
@@ -5,12 +5,13 @@
     <p:sldMasterId id="2147483648" r:id="rId1"/>
   </p:sldMasterIdLst>
   <p:notesMasterIdLst>
-    <p:notesMasterId r:id="rId5"/>
+    <p:notesMasterId r:id="rId6"/>
   </p:notesMasterIdLst>
   <p:sldIdLst>
-    <p:sldId id="256" r:id="rId2"/>
-    <p:sldId id="257" r:id="rId3"/>
-    <p:sldId id="258" r:id="rId4"/>
+    <p:sldId id="259" r:id="rId2"/>
+    <p:sldId id="256" r:id="rId3"/>
+    <p:sldId id="257" r:id="rId4"/>
+    <p:sldId id="258" r:id="rId5"/>
   </p:sldIdLst>
   <p:sldSz cx="12192000" cy="6858000"/>
   <p:notesSz cx="6858000" cy="9144000"/>
@@ -199,7 +200,7 @@
           <a:p>
             <a:fld id="{209AFF13-D57B-49C4-A1B6-ABD758E6069C}" type="datetimeFigureOut">
               <a:rPr lang="pt-PT" smtClean="0"/>
-              <a:t>31/08/2021</a:t>
+              <a:t>06/09/2021</a:t>
             </a:fld>
             <a:endParaRPr lang="pt-PT"/>
           </a:p>
@@ -540,7 +541,7 @@
           <a:p>
             <a:fld id="{525BF663-0CF6-4152-93BA-E6213EA844DF}" type="slidenum">
               <a:rPr lang="pt-PT" smtClean="0"/>
-              <a:t>3</a:t>
+              <a:t>4</a:t>
             </a:fld>
             <a:endParaRPr lang="pt-PT"/>
           </a:p>
@@ -690,7 +691,7 @@
           <a:p>
             <a:fld id="{8635A13E-CC1A-4EBE-9635-2354845B9288}" type="datetimeFigureOut">
               <a:rPr lang="pt-PT" smtClean="0"/>
-              <a:t>31/08/2021</a:t>
+              <a:t>06/09/2021</a:t>
             </a:fld>
             <a:endParaRPr lang="pt-PT"/>
           </a:p>
@@ -860,7 +861,7 @@
           <a:p>
             <a:fld id="{8635A13E-CC1A-4EBE-9635-2354845B9288}" type="datetimeFigureOut">
               <a:rPr lang="pt-PT" smtClean="0"/>
-              <a:t>31/08/2021</a:t>
+              <a:t>06/09/2021</a:t>
             </a:fld>
             <a:endParaRPr lang="pt-PT"/>
           </a:p>
@@ -1040,7 +1041,7 @@
           <a:p>
             <a:fld id="{8635A13E-CC1A-4EBE-9635-2354845B9288}" type="datetimeFigureOut">
               <a:rPr lang="pt-PT" smtClean="0"/>
-              <a:t>31/08/2021</a:t>
+              <a:t>06/09/2021</a:t>
             </a:fld>
             <a:endParaRPr lang="pt-PT"/>
           </a:p>
@@ -1210,7 +1211,7 @@
           <a:p>
             <a:fld id="{8635A13E-CC1A-4EBE-9635-2354845B9288}" type="datetimeFigureOut">
               <a:rPr lang="pt-PT" smtClean="0"/>
-              <a:t>31/08/2021</a:t>
+              <a:t>06/09/2021</a:t>
             </a:fld>
             <a:endParaRPr lang="pt-PT"/>
           </a:p>
@@ -1456,7 +1457,7 @@
           <a:p>
             <a:fld id="{8635A13E-CC1A-4EBE-9635-2354845B9288}" type="datetimeFigureOut">
               <a:rPr lang="pt-PT" smtClean="0"/>
-              <a:t>31/08/2021</a:t>
+              <a:t>06/09/2021</a:t>
             </a:fld>
             <a:endParaRPr lang="pt-PT"/>
           </a:p>
@@ -1688,7 +1689,7 @@
           <a:p>
             <a:fld id="{8635A13E-CC1A-4EBE-9635-2354845B9288}" type="datetimeFigureOut">
               <a:rPr lang="pt-PT" smtClean="0"/>
-              <a:t>31/08/2021</a:t>
+              <a:t>06/09/2021</a:t>
             </a:fld>
             <a:endParaRPr lang="pt-PT"/>
           </a:p>
@@ -2055,7 +2056,7 @@
           <a:p>
             <a:fld id="{8635A13E-CC1A-4EBE-9635-2354845B9288}" type="datetimeFigureOut">
               <a:rPr lang="pt-PT" smtClean="0"/>
-              <a:t>31/08/2021</a:t>
+              <a:t>06/09/2021</a:t>
             </a:fld>
             <a:endParaRPr lang="pt-PT"/>
           </a:p>
@@ -2173,7 +2174,7 @@
           <a:p>
             <a:fld id="{8635A13E-CC1A-4EBE-9635-2354845B9288}" type="datetimeFigureOut">
               <a:rPr lang="pt-PT" smtClean="0"/>
-              <a:t>31/08/2021</a:t>
+              <a:t>06/09/2021</a:t>
             </a:fld>
             <a:endParaRPr lang="pt-PT"/>
           </a:p>
@@ -2268,7 +2269,7 @@
           <a:p>
             <a:fld id="{8635A13E-CC1A-4EBE-9635-2354845B9288}" type="datetimeFigureOut">
               <a:rPr lang="pt-PT" smtClean="0"/>
-              <a:t>31/08/2021</a:t>
+              <a:t>06/09/2021</a:t>
             </a:fld>
             <a:endParaRPr lang="pt-PT"/>
           </a:p>
@@ -2545,7 +2546,7 @@
           <a:p>
             <a:fld id="{8635A13E-CC1A-4EBE-9635-2354845B9288}" type="datetimeFigureOut">
               <a:rPr lang="pt-PT" smtClean="0"/>
-              <a:t>31/08/2021</a:t>
+              <a:t>06/09/2021</a:t>
             </a:fld>
             <a:endParaRPr lang="pt-PT"/>
           </a:p>
@@ -2798,7 +2799,7 @@
           <a:p>
             <a:fld id="{8635A13E-CC1A-4EBE-9635-2354845B9288}" type="datetimeFigureOut">
               <a:rPr lang="pt-PT" smtClean="0"/>
-              <a:t>31/08/2021</a:t>
+              <a:t>06/09/2021</a:t>
             </a:fld>
             <a:endParaRPr lang="pt-PT"/>
           </a:p>
@@ -3011,7 +3012,7 @@
           <a:p>
             <a:fld id="{8635A13E-CC1A-4EBE-9635-2354845B9288}" type="datetimeFigureOut">
               <a:rPr lang="pt-PT" smtClean="0"/>
-              <a:t>31/08/2021</a:t>
+              <a:t>06/09/2021</a:t>
             </a:fld>
             <a:endParaRPr lang="pt-PT"/>
           </a:p>
@@ -3418,6 +3419,83 @@
       </p:grpSpPr>
       <p:sp>
         <p:nvSpPr>
+          <p:cNvPr id="2" name="Title 1"/>
+          <p:cNvSpPr>
+            <a:spLocks noGrp="1"/>
+          </p:cNvSpPr>
+          <p:nvPr>
+            <p:ph type="title"/>
+          </p:nvPr>
+        </p:nvSpPr>
+        <p:spPr/>
+        <p:txBody>
+          <a:bodyPr/>
+          <a:lstStyle/>
+          <a:p>
+            <a:r>
+              <a:rPr lang="pt-PT" dirty="0" smtClean="0"/>
+              <a:t>SETUP</a:t>
+            </a:r>
+            <a:endParaRPr lang="pt-PT" dirty="0"/>
+          </a:p>
+        </p:txBody>
+      </p:sp>
+      <p:pic>
+        <p:nvPicPr>
+          <p:cNvPr id="3" name="Picture 2"/>
+          <p:cNvPicPr>
+            <a:picLocks noChangeAspect="1"/>
+          </p:cNvPicPr>
+          <p:nvPr/>
+        </p:nvPicPr>
+        <p:blipFill>
+          <a:blip r:embed="rId2"/>
+          <a:stretch>
+            <a:fillRect/>
+          </a:stretch>
+        </p:blipFill>
+        <p:spPr>
+          <a:xfrm>
+            <a:off x="1268083" y="742625"/>
+            <a:ext cx="10787950" cy="6006520"/>
+          </a:xfrm>
+          <a:prstGeom prst="rect">
+            <a:avLst/>
+          </a:prstGeom>
+        </p:spPr>
+      </p:pic>
+    </p:spTree>
+    <p:extLst>
+      <p:ext uri="{BB962C8B-B14F-4D97-AF65-F5344CB8AC3E}">
+        <p14:creationId xmlns:p14="http://schemas.microsoft.com/office/powerpoint/2010/main" val="3368834563"/>
+      </p:ext>
+    </p:extLst>
+  </p:cSld>
+  <p:clrMapOvr>
+    <a:masterClrMapping/>
+  </p:clrMapOvr>
+</p:sld>
+</file>
+
+<file path=ppt/slides/slide2.xml><?xml version="1.0" encoding="utf-8"?>
+<p:sld xmlns:a="http://schemas.openxmlformats.org/drawingml/2006/main" xmlns:r="http://schemas.openxmlformats.org/officeDocument/2006/relationships" xmlns:p="http://schemas.openxmlformats.org/presentationml/2006/main">
+  <p:cSld>
+    <p:spTree>
+      <p:nvGrpSpPr>
+        <p:cNvPr id="1" name=""/>
+        <p:cNvGrpSpPr/>
+        <p:nvPr/>
+      </p:nvGrpSpPr>
+      <p:grpSpPr>
+        <a:xfrm>
+          <a:off x="0" y="0"/>
+          <a:ext cx="0" cy="0"/>
+          <a:chOff x="0" y="0"/>
+          <a:chExt cx="0" cy="0"/>
+        </a:xfrm>
+      </p:grpSpPr>
+      <p:sp>
+        <p:nvSpPr>
           <p:cNvPr id="6" name="Title 5"/>
           <p:cNvSpPr>
             <a:spLocks noGrp="1"/>
@@ -3476,7 +3554,7 @@
 </p:sld>
 </file>
 
-<file path=ppt/slides/slide2.xml><?xml version="1.0" encoding="utf-8"?>
+<file path=ppt/slides/slide3.xml><?xml version="1.0" encoding="utf-8"?>
 <p:sld xmlns:a="http://schemas.openxmlformats.org/drawingml/2006/main" xmlns:r="http://schemas.openxmlformats.org/officeDocument/2006/relationships" xmlns:p="http://schemas.openxmlformats.org/presentationml/2006/main">
   <p:cSld>
     <p:spTree>
@@ -3553,7 +3631,7 @@
 </p:sld>
 </file>
 
-<file path=ppt/slides/slide3.xml><?xml version="1.0" encoding="utf-8"?>
+<file path=ppt/slides/slide4.xml><?xml version="1.0" encoding="utf-8"?>
 <p:sld xmlns:a="http://schemas.openxmlformats.org/drawingml/2006/main" xmlns:r="http://schemas.openxmlformats.org/officeDocument/2006/relationships" xmlns:p="http://schemas.openxmlformats.org/presentationml/2006/main">
   <p:cSld>
     <p:spTree>

</xml_diff>

<commit_message>
updated measurements; updated scripts for new measurements; updated readme
</commit_message>
<xml_diff>
--- a/3.documents/Demonstrations.pptx
+++ b/3.documents/Demonstrations.pptx
@@ -2,18 +2,20 @@
 <file path=ppt/presentation.xml><?xml version="1.0" encoding="utf-8"?>
 <p:presentation xmlns:a="http://schemas.openxmlformats.org/drawingml/2006/main" xmlns:r="http://schemas.openxmlformats.org/officeDocument/2006/relationships" xmlns:p="http://schemas.openxmlformats.org/presentationml/2006/main" saveSubsetFonts="1">
   <p:sldMasterIdLst>
-    <p:sldMasterId id="2147483648" r:id="rId1"/>
+    <p:sldMasterId id="2147483660" r:id="rId1"/>
   </p:sldMasterIdLst>
   <p:notesMasterIdLst>
-    <p:notesMasterId r:id="rId6"/>
+    <p:notesMasterId r:id="rId8"/>
   </p:notesMasterIdLst>
   <p:sldIdLst>
-    <p:sldId id="259" r:id="rId2"/>
-    <p:sldId id="256" r:id="rId3"/>
-    <p:sldId id="257" r:id="rId4"/>
-    <p:sldId id="258" r:id="rId5"/>
+    <p:sldId id="260" r:id="rId2"/>
+    <p:sldId id="261" r:id="rId3"/>
+    <p:sldId id="262" r:id="rId4"/>
+    <p:sldId id="263" r:id="rId5"/>
+    <p:sldId id="264" r:id="rId6"/>
+    <p:sldId id="265" r:id="rId7"/>
   </p:sldIdLst>
-  <p:sldSz cx="12192000" cy="6858000"/>
+  <p:sldSz cx="9144000" cy="6858000" type="screen4x3"/>
   <p:notesSz cx="6858000" cy="9144000"/>
   <p:defaultTextStyle>
     <a:defPPr>
@@ -118,6 +120,18 @@
 </p:presentation>
 </file>
 
+<file path=ppt/commentAuthors.xml><?xml version="1.0" encoding="utf-8"?>
+<p:cmAuthorLst xmlns:a="http://schemas.openxmlformats.org/drawingml/2006/main" xmlns:r="http://schemas.openxmlformats.org/officeDocument/2006/relationships" xmlns:p="http://schemas.openxmlformats.org/presentationml/2006/main">
+  <p:cmAuthor id="1" name="Reviewer" initials="REV" lastIdx="1" clrIdx="0">
+    <p:extLst>
+      <p:ext uri="{19B8F6BF-5375-455C-9EA6-DF929625EA0E}">
+        <p15:presenceInfo xmlns:p15="http://schemas.microsoft.com/office/powerpoint/2012/main" userId="Reviewer" providerId="None"/>
+      </p:ext>
+    </p:extLst>
+  </p:cmAuthor>
+</p:cmAuthorLst>
+</file>
+
 <file path=ppt/notesMasters/notesMaster1.xml><?xml version="1.0" encoding="utf-8"?>
 <p:notesMaster xmlns:a="http://schemas.openxmlformats.org/drawingml/2006/main" xmlns:r="http://schemas.openxmlformats.org/officeDocument/2006/relationships" xmlns:p="http://schemas.openxmlformats.org/presentationml/2006/main">
   <p:cSld>
@@ -200,7 +214,7 @@
           <a:p>
             <a:fld id="{209AFF13-D57B-49C4-A1B6-ABD758E6069C}" type="datetimeFigureOut">
               <a:rPr lang="pt-PT" smtClean="0"/>
-              <a:t>06/09/2021</a:t>
+              <a:t>09/09/2021</a:t>
             </a:fld>
             <a:endParaRPr lang="pt-PT"/>
           </a:p>
@@ -218,8 +232,8 @@
         </p:nvSpPr>
         <p:spPr>
           <a:xfrm>
-            <a:off x="685800" y="1143000"/>
-            <a:ext cx="5486400" cy="3086100"/>
+            <a:off x="1371600" y="1143000"/>
+            <a:ext cx="4114800" cy="3086100"/>
           </a:xfrm>
           <a:prstGeom prst="rect">
             <a:avLst/>
@@ -468,98 +482,6 @@
 </p:notesMaster>
 </file>
 
-<file path=ppt/notesSlides/notesSlide1.xml><?xml version="1.0" encoding="utf-8"?>
-<p:notes xmlns:a="http://schemas.openxmlformats.org/drawingml/2006/main" xmlns:r="http://schemas.openxmlformats.org/officeDocument/2006/relationships" xmlns:p="http://schemas.openxmlformats.org/presentationml/2006/main">
-  <p:cSld>
-    <p:spTree>
-      <p:nvGrpSpPr>
-        <p:cNvPr id="1" name=""/>
-        <p:cNvGrpSpPr/>
-        <p:nvPr/>
-      </p:nvGrpSpPr>
-      <p:grpSpPr>
-        <a:xfrm>
-          <a:off x="0" y="0"/>
-          <a:ext cx="0" cy="0"/>
-          <a:chOff x="0" y="0"/>
-          <a:chExt cx="0" cy="0"/>
-        </a:xfrm>
-      </p:grpSpPr>
-      <p:sp>
-        <p:nvSpPr>
-          <p:cNvPr id="2" name="Slide Image Placeholder 1"/>
-          <p:cNvSpPr>
-            <a:spLocks noGrp="1" noRot="1" noChangeAspect="1"/>
-          </p:cNvSpPr>
-          <p:nvPr>
-            <p:ph type="sldImg"/>
-          </p:nvPr>
-        </p:nvSpPr>
-        <p:spPr/>
-      </p:sp>
-      <p:sp>
-        <p:nvSpPr>
-          <p:cNvPr id="3" name="Notes Placeholder 2"/>
-          <p:cNvSpPr>
-            <a:spLocks noGrp="1"/>
-          </p:cNvSpPr>
-          <p:nvPr>
-            <p:ph type="body" idx="1"/>
-          </p:nvPr>
-        </p:nvSpPr>
-        <p:spPr/>
-        <p:txBody>
-          <a:bodyPr/>
-          <a:lstStyle/>
-          <a:p>
-            <a:r>
-              <a:rPr lang="pt-PT" dirty="0" smtClean="0"/>
-              <a:t>Manter</a:t>
-            </a:r>
-            <a:r>
-              <a:rPr lang="pt-PT" baseline="0" dirty="0" smtClean="0"/>
-              <a:t> measurement DEMO 1 e 2</a:t>
-            </a:r>
-            <a:endParaRPr lang="pt-PT" dirty="0"/>
-          </a:p>
-        </p:txBody>
-      </p:sp>
-      <p:sp>
-        <p:nvSpPr>
-          <p:cNvPr id="4" name="Slide Number Placeholder 3"/>
-          <p:cNvSpPr>
-            <a:spLocks noGrp="1"/>
-          </p:cNvSpPr>
-          <p:nvPr>
-            <p:ph type="sldNum" sz="quarter" idx="10"/>
-          </p:nvPr>
-        </p:nvSpPr>
-        <p:spPr/>
-        <p:txBody>
-          <a:bodyPr/>
-          <a:lstStyle/>
-          <a:p>
-            <a:fld id="{525BF663-0CF6-4152-93BA-E6213EA844DF}" type="slidenum">
-              <a:rPr lang="pt-PT" smtClean="0"/>
-              <a:t>4</a:t>
-            </a:fld>
-            <a:endParaRPr lang="pt-PT"/>
-          </a:p>
-        </p:txBody>
-      </p:sp>
-    </p:spTree>
-    <p:extLst>
-      <p:ext uri="{BB962C8B-B14F-4D97-AF65-F5344CB8AC3E}">
-        <p14:creationId xmlns:p14="http://schemas.microsoft.com/office/powerpoint/2010/main" val="2729822252"/>
-      </p:ext>
-    </p:extLst>
-  </p:cSld>
-  <p:clrMapOvr>
-    <a:masterClrMapping/>
-  </p:clrMapOvr>
-</p:notes>
-</file>
-
 <file path=ppt/slideLayouts/slideLayout1.xml><?xml version="1.0" encoding="utf-8"?>
 <p:sldLayout xmlns:a="http://schemas.openxmlformats.org/drawingml/2006/main" xmlns:r="http://schemas.openxmlformats.org/officeDocument/2006/relationships" xmlns:p="http://schemas.openxmlformats.org/presentationml/2006/main" type="title" preserve="1">
   <p:cSld name="Title Slide">
@@ -589,8 +511,8 @@
         </p:nvSpPr>
         <p:spPr>
           <a:xfrm>
-            <a:off x="1524000" y="1122363"/>
-            <a:ext cx="9144000" cy="2387600"/>
+            <a:off x="685800" y="1122363"/>
+            <a:ext cx="7772400" cy="2387600"/>
           </a:xfrm>
         </p:spPr>
         <p:txBody>
@@ -605,7 +527,7 @@
               <a:rPr lang="en-US" smtClean="0"/>
               <a:t>Click to edit Master title style</a:t>
             </a:r>
-            <a:endParaRPr lang="pt-PT"/>
+            <a:endParaRPr lang="en-US" dirty="0"/>
           </a:p>
         </p:txBody>
       </p:sp>
@@ -621,8 +543,8 @@
         </p:nvSpPr>
         <p:spPr>
           <a:xfrm>
-            <a:off x="1524000" y="3602038"/>
-            <a:ext cx="9144000" cy="1655762"/>
+            <a:off x="1143000" y="3602038"/>
+            <a:ext cx="6858000" cy="1655762"/>
           </a:xfrm>
         </p:spPr>
         <p:txBody>
@@ -670,7 +592,7 @@
               <a:rPr lang="en-US" smtClean="0"/>
               <a:t>Click to edit Master subtitle style</a:t>
             </a:r>
-            <a:endParaRPr lang="pt-PT"/>
+            <a:endParaRPr lang="en-US" dirty="0"/>
           </a:p>
         </p:txBody>
       </p:sp>
@@ -691,7 +613,7 @@
           <a:p>
             <a:fld id="{8635A13E-CC1A-4EBE-9635-2354845B9288}" type="datetimeFigureOut">
               <a:rPr lang="pt-PT" smtClean="0"/>
-              <a:t>06/09/2021</a:t>
+              <a:t>09/09/2021</a:t>
             </a:fld>
             <a:endParaRPr lang="pt-PT"/>
           </a:p>
@@ -742,7 +664,7 @@
     </p:spTree>
     <p:extLst>
       <p:ext uri="{BB962C8B-B14F-4D97-AF65-F5344CB8AC3E}">
-        <p14:creationId xmlns:p14="http://schemas.microsoft.com/office/powerpoint/2010/main" val="3808979295"/>
+        <p14:creationId xmlns:p14="http://schemas.microsoft.com/office/powerpoint/2010/main" val="4250850203"/>
       </p:ext>
     </p:extLst>
   </p:cSld>
@@ -788,7 +710,7 @@
               <a:rPr lang="en-US" smtClean="0"/>
               <a:t>Click to edit Master title style</a:t>
             </a:r>
-            <a:endParaRPr lang="pt-PT"/>
+            <a:endParaRPr lang="en-US" dirty="0"/>
           </a:p>
         </p:txBody>
       </p:sp>
@@ -840,7 +762,7 @@
               <a:rPr lang="en-US" smtClean="0"/>
               <a:t>Fifth level</a:t>
             </a:r>
-            <a:endParaRPr lang="pt-PT"/>
+            <a:endParaRPr lang="en-US" dirty="0"/>
           </a:p>
         </p:txBody>
       </p:sp>
@@ -861,7 +783,7 @@
           <a:p>
             <a:fld id="{8635A13E-CC1A-4EBE-9635-2354845B9288}" type="datetimeFigureOut">
               <a:rPr lang="pt-PT" smtClean="0"/>
-              <a:t>06/09/2021</a:t>
+              <a:t>09/09/2021</a:t>
             </a:fld>
             <a:endParaRPr lang="pt-PT"/>
           </a:p>
@@ -912,7 +834,7 @@
     </p:spTree>
     <p:extLst>
       <p:ext uri="{BB962C8B-B14F-4D97-AF65-F5344CB8AC3E}">
-        <p14:creationId xmlns:p14="http://schemas.microsoft.com/office/powerpoint/2010/main" val="2780295967"/>
+        <p14:creationId xmlns:p14="http://schemas.microsoft.com/office/powerpoint/2010/main" val="2818086578"/>
       </p:ext>
     </p:extLst>
   </p:cSld>
@@ -951,8 +873,8 @@
         </p:nvSpPr>
         <p:spPr>
           <a:xfrm>
-            <a:off x="8724900" y="365125"/>
-            <a:ext cx="2628900" cy="5811838"/>
+            <a:off x="6543675" y="365125"/>
+            <a:ext cx="1971675" cy="5811838"/>
           </a:xfrm>
         </p:spPr>
         <p:txBody>
@@ -963,7 +885,7 @@
               <a:rPr lang="en-US" smtClean="0"/>
               <a:t>Click to edit Master title style</a:t>
             </a:r>
-            <a:endParaRPr lang="pt-PT"/>
+            <a:endParaRPr lang="en-US" dirty="0"/>
           </a:p>
         </p:txBody>
       </p:sp>
@@ -979,8 +901,8 @@
         </p:nvSpPr>
         <p:spPr>
           <a:xfrm>
-            <a:off x="838200" y="365125"/>
-            <a:ext cx="7734300" cy="5811838"/>
+            <a:off x="628650" y="365125"/>
+            <a:ext cx="5800725" cy="5811838"/>
           </a:xfrm>
         </p:spPr>
         <p:txBody>
@@ -1020,7 +942,7 @@
               <a:rPr lang="en-US" smtClean="0"/>
               <a:t>Fifth level</a:t>
             </a:r>
-            <a:endParaRPr lang="pt-PT"/>
+            <a:endParaRPr lang="en-US" dirty="0"/>
           </a:p>
         </p:txBody>
       </p:sp>
@@ -1041,7 +963,7 @@
           <a:p>
             <a:fld id="{8635A13E-CC1A-4EBE-9635-2354845B9288}" type="datetimeFigureOut">
               <a:rPr lang="pt-PT" smtClean="0"/>
-              <a:t>06/09/2021</a:t>
+              <a:t>09/09/2021</a:t>
             </a:fld>
             <a:endParaRPr lang="pt-PT"/>
           </a:p>
@@ -1092,7 +1014,7 @@
     </p:spTree>
     <p:extLst>
       <p:ext uri="{BB962C8B-B14F-4D97-AF65-F5344CB8AC3E}">
-        <p14:creationId xmlns:p14="http://schemas.microsoft.com/office/powerpoint/2010/main" val="1904694595"/>
+        <p14:creationId xmlns:p14="http://schemas.microsoft.com/office/powerpoint/2010/main" val="1957723398"/>
       </p:ext>
     </p:extLst>
   </p:cSld>
@@ -1138,7 +1060,7 @@
               <a:rPr lang="en-US" smtClean="0"/>
               <a:t>Click to edit Master title style</a:t>
             </a:r>
-            <a:endParaRPr lang="pt-PT"/>
+            <a:endParaRPr lang="en-US" dirty="0"/>
           </a:p>
         </p:txBody>
       </p:sp>
@@ -1190,7 +1112,7 @@
               <a:rPr lang="en-US" smtClean="0"/>
               <a:t>Fifth level</a:t>
             </a:r>
-            <a:endParaRPr lang="pt-PT"/>
+            <a:endParaRPr lang="en-US" dirty="0"/>
           </a:p>
         </p:txBody>
       </p:sp>
@@ -1211,7 +1133,7 @@
           <a:p>
             <a:fld id="{8635A13E-CC1A-4EBE-9635-2354845B9288}" type="datetimeFigureOut">
               <a:rPr lang="pt-PT" smtClean="0"/>
-              <a:t>06/09/2021</a:t>
+              <a:t>09/09/2021</a:t>
             </a:fld>
             <a:endParaRPr lang="pt-PT"/>
           </a:p>
@@ -1262,7 +1184,7 @@
     </p:spTree>
     <p:extLst>
       <p:ext uri="{BB962C8B-B14F-4D97-AF65-F5344CB8AC3E}">
-        <p14:creationId xmlns:p14="http://schemas.microsoft.com/office/powerpoint/2010/main" val="3562203327"/>
+        <p14:creationId xmlns:p14="http://schemas.microsoft.com/office/powerpoint/2010/main" val="2951325304"/>
       </p:ext>
     </p:extLst>
   </p:cSld>
@@ -1301,8 +1223,8 @@
         </p:nvSpPr>
         <p:spPr>
           <a:xfrm>
-            <a:off x="831850" y="1709738"/>
-            <a:ext cx="10515600" cy="2852737"/>
+            <a:off x="623888" y="1709739"/>
+            <a:ext cx="7886700" cy="2852737"/>
           </a:xfrm>
         </p:spPr>
         <p:txBody>
@@ -1317,7 +1239,7 @@
               <a:rPr lang="en-US" smtClean="0"/>
               <a:t>Click to edit Master title style</a:t>
             </a:r>
-            <a:endParaRPr lang="pt-PT"/>
+            <a:endParaRPr lang="en-US" dirty="0"/>
           </a:p>
         </p:txBody>
       </p:sp>
@@ -1333,8 +1255,8 @@
         </p:nvSpPr>
         <p:spPr>
           <a:xfrm>
-            <a:off x="831850" y="4589463"/>
-            <a:ext cx="10515600" cy="1500187"/>
+            <a:off x="623888" y="4589464"/>
+            <a:ext cx="7886700" cy="1500187"/>
           </a:xfrm>
         </p:spPr>
         <p:txBody>
@@ -1344,9 +1266,7 @@
               <a:buNone/>
               <a:defRPr sz="2400">
                 <a:solidFill>
-                  <a:schemeClr val="tx1">
-                    <a:tint val="75000"/>
-                  </a:schemeClr>
+                  <a:schemeClr val="tx1"/>
                 </a:solidFill>
               </a:defRPr>
             </a:lvl1pPr>
@@ -1457,7 +1377,7 @@
           <a:p>
             <a:fld id="{8635A13E-CC1A-4EBE-9635-2354845B9288}" type="datetimeFigureOut">
               <a:rPr lang="pt-PT" smtClean="0"/>
-              <a:t>06/09/2021</a:t>
+              <a:t>09/09/2021</a:t>
             </a:fld>
             <a:endParaRPr lang="pt-PT"/>
           </a:p>
@@ -1508,7 +1428,7 @@
     </p:spTree>
     <p:extLst>
       <p:ext uri="{BB962C8B-B14F-4D97-AF65-F5344CB8AC3E}">
-        <p14:creationId xmlns:p14="http://schemas.microsoft.com/office/powerpoint/2010/main" val="2278134447"/>
+        <p14:creationId xmlns:p14="http://schemas.microsoft.com/office/powerpoint/2010/main" val="4244776588"/>
       </p:ext>
     </p:extLst>
   </p:cSld>
@@ -1554,7 +1474,7 @@
               <a:rPr lang="en-US" smtClean="0"/>
               <a:t>Click to edit Master title style</a:t>
             </a:r>
-            <a:endParaRPr lang="pt-PT"/>
+            <a:endParaRPr lang="en-US" dirty="0"/>
           </a:p>
         </p:txBody>
       </p:sp>
@@ -1570,8 +1490,8 @@
         </p:nvSpPr>
         <p:spPr>
           <a:xfrm>
-            <a:off x="838200" y="1825625"/>
-            <a:ext cx="5181600" cy="4351338"/>
+            <a:off x="628650" y="1825625"/>
+            <a:ext cx="3886200" cy="4351338"/>
           </a:xfrm>
         </p:spPr>
         <p:txBody>
@@ -1611,7 +1531,7 @@
               <a:rPr lang="en-US" smtClean="0"/>
               <a:t>Fifth level</a:t>
             </a:r>
-            <a:endParaRPr lang="pt-PT"/>
+            <a:endParaRPr lang="en-US" dirty="0"/>
           </a:p>
         </p:txBody>
       </p:sp>
@@ -1627,8 +1547,8 @@
         </p:nvSpPr>
         <p:spPr>
           <a:xfrm>
-            <a:off x="6172200" y="1825625"/>
-            <a:ext cx="5181600" cy="4351338"/>
+            <a:off x="4629150" y="1825625"/>
+            <a:ext cx="3886200" cy="4351338"/>
           </a:xfrm>
         </p:spPr>
         <p:txBody>
@@ -1668,7 +1588,7 @@
               <a:rPr lang="en-US" smtClean="0"/>
               <a:t>Fifth level</a:t>
             </a:r>
-            <a:endParaRPr lang="pt-PT"/>
+            <a:endParaRPr lang="en-US" dirty="0"/>
           </a:p>
         </p:txBody>
       </p:sp>
@@ -1689,7 +1609,7 @@
           <a:p>
             <a:fld id="{8635A13E-CC1A-4EBE-9635-2354845B9288}" type="datetimeFigureOut">
               <a:rPr lang="pt-PT" smtClean="0"/>
-              <a:t>06/09/2021</a:t>
+              <a:t>09/09/2021</a:t>
             </a:fld>
             <a:endParaRPr lang="pt-PT"/>
           </a:p>
@@ -1740,7 +1660,7 @@
     </p:spTree>
     <p:extLst>
       <p:ext uri="{BB962C8B-B14F-4D97-AF65-F5344CB8AC3E}">
-        <p14:creationId xmlns:p14="http://schemas.microsoft.com/office/powerpoint/2010/main" val="1040302845"/>
+        <p14:creationId xmlns:p14="http://schemas.microsoft.com/office/powerpoint/2010/main" val="492402230"/>
       </p:ext>
     </p:extLst>
   </p:cSld>
@@ -1779,8 +1699,8 @@
         </p:nvSpPr>
         <p:spPr>
           <a:xfrm>
-            <a:off x="839788" y="365125"/>
-            <a:ext cx="10515600" cy="1325563"/>
+            <a:off x="629841" y="365126"/>
+            <a:ext cx="7886700" cy="1325563"/>
           </a:xfrm>
         </p:spPr>
         <p:txBody>
@@ -1791,7 +1711,7 @@
               <a:rPr lang="en-US" smtClean="0"/>
               <a:t>Click to edit Master title style</a:t>
             </a:r>
-            <a:endParaRPr lang="pt-PT"/>
+            <a:endParaRPr lang="en-US" dirty="0"/>
           </a:p>
         </p:txBody>
       </p:sp>
@@ -1807,8 +1727,8 @@
         </p:nvSpPr>
         <p:spPr>
           <a:xfrm>
-            <a:off x="839788" y="1681163"/>
-            <a:ext cx="5157787" cy="823912"/>
+            <a:off x="629842" y="1681163"/>
+            <a:ext cx="3868340" cy="823912"/>
           </a:xfrm>
         </p:spPr>
         <p:txBody>
@@ -1872,8 +1792,8 @@
         </p:nvSpPr>
         <p:spPr>
           <a:xfrm>
-            <a:off x="839788" y="2505075"/>
-            <a:ext cx="5157787" cy="3684588"/>
+            <a:off x="629842" y="2505075"/>
+            <a:ext cx="3868340" cy="3684588"/>
           </a:xfrm>
         </p:spPr>
         <p:txBody>
@@ -1913,7 +1833,7 @@
               <a:rPr lang="en-US" smtClean="0"/>
               <a:t>Fifth level</a:t>
             </a:r>
-            <a:endParaRPr lang="pt-PT"/>
+            <a:endParaRPr lang="en-US" dirty="0"/>
           </a:p>
         </p:txBody>
       </p:sp>
@@ -1929,8 +1849,8 @@
         </p:nvSpPr>
         <p:spPr>
           <a:xfrm>
-            <a:off x="6172200" y="1681163"/>
-            <a:ext cx="5183188" cy="823912"/>
+            <a:off x="4629150" y="1681163"/>
+            <a:ext cx="3887391" cy="823912"/>
           </a:xfrm>
         </p:spPr>
         <p:txBody>
@@ -1994,8 +1914,8 @@
         </p:nvSpPr>
         <p:spPr>
           <a:xfrm>
-            <a:off x="6172200" y="2505075"/>
-            <a:ext cx="5183188" cy="3684588"/>
+            <a:off x="4629150" y="2505075"/>
+            <a:ext cx="3887391" cy="3684588"/>
           </a:xfrm>
         </p:spPr>
         <p:txBody>
@@ -2035,7 +1955,7 @@
               <a:rPr lang="en-US" smtClean="0"/>
               <a:t>Fifth level</a:t>
             </a:r>
-            <a:endParaRPr lang="pt-PT"/>
+            <a:endParaRPr lang="en-US" dirty="0"/>
           </a:p>
         </p:txBody>
       </p:sp>
@@ -2056,7 +1976,7 @@
           <a:p>
             <a:fld id="{8635A13E-CC1A-4EBE-9635-2354845B9288}" type="datetimeFigureOut">
               <a:rPr lang="pt-PT" smtClean="0"/>
-              <a:t>06/09/2021</a:t>
+              <a:t>09/09/2021</a:t>
             </a:fld>
             <a:endParaRPr lang="pt-PT"/>
           </a:p>
@@ -2107,7 +2027,7 @@
     </p:spTree>
     <p:extLst>
       <p:ext uri="{BB962C8B-B14F-4D97-AF65-F5344CB8AC3E}">
-        <p14:creationId xmlns:p14="http://schemas.microsoft.com/office/powerpoint/2010/main" val="1874566077"/>
+        <p14:creationId xmlns:p14="http://schemas.microsoft.com/office/powerpoint/2010/main" val="964998531"/>
       </p:ext>
     </p:extLst>
   </p:cSld>
@@ -2153,7 +2073,7 @@
               <a:rPr lang="en-US" smtClean="0"/>
               <a:t>Click to edit Master title style</a:t>
             </a:r>
-            <a:endParaRPr lang="pt-PT"/>
+            <a:endParaRPr lang="en-US" dirty="0"/>
           </a:p>
         </p:txBody>
       </p:sp>
@@ -2174,7 +2094,7 @@
           <a:p>
             <a:fld id="{8635A13E-CC1A-4EBE-9635-2354845B9288}" type="datetimeFigureOut">
               <a:rPr lang="pt-PT" smtClean="0"/>
-              <a:t>06/09/2021</a:t>
+              <a:t>09/09/2021</a:t>
             </a:fld>
             <a:endParaRPr lang="pt-PT"/>
           </a:p>
@@ -2225,7 +2145,7 @@
     </p:spTree>
     <p:extLst>
       <p:ext uri="{BB962C8B-B14F-4D97-AF65-F5344CB8AC3E}">
-        <p14:creationId xmlns:p14="http://schemas.microsoft.com/office/powerpoint/2010/main" val="88398961"/>
+        <p14:creationId xmlns:p14="http://schemas.microsoft.com/office/powerpoint/2010/main" val="1953711731"/>
       </p:ext>
     </p:extLst>
   </p:cSld>
@@ -2269,7 +2189,7 @@
           <a:p>
             <a:fld id="{8635A13E-CC1A-4EBE-9635-2354845B9288}" type="datetimeFigureOut">
               <a:rPr lang="pt-PT" smtClean="0"/>
-              <a:t>06/09/2021</a:t>
+              <a:t>09/09/2021</a:t>
             </a:fld>
             <a:endParaRPr lang="pt-PT"/>
           </a:p>
@@ -2320,7 +2240,7 @@
     </p:spTree>
     <p:extLst>
       <p:ext uri="{BB962C8B-B14F-4D97-AF65-F5344CB8AC3E}">
-        <p14:creationId xmlns:p14="http://schemas.microsoft.com/office/powerpoint/2010/main" val="337664490"/>
+        <p14:creationId xmlns:p14="http://schemas.microsoft.com/office/powerpoint/2010/main" val="41029181"/>
       </p:ext>
     </p:extLst>
   </p:cSld>
@@ -2359,8 +2279,8 @@
         </p:nvSpPr>
         <p:spPr>
           <a:xfrm>
-            <a:off x="839788" y="457200"/>
-            <a:ext cx="3932237" cy="1600200"/>
+            <a:off x="629841" y="457200"/>
+            <a:ext cx="2949178" cy="1600200"/>
           </a:xfrm>
         </p:spPr>
         <p:txBody>
@@ -2375,7 +2295,7 @@
               <a:rPr lang="en-US" smtClean="0"/>
               <a:t>Click to edit Master title style</a:t>
             </a:r>
-            <a:endParaRPr lang="pt-PT"/>
+            <a:endParaRPr lang="en-US" dirty="0"/>
           </a:p>
         </p:txBody>
       </p:sp>
@@ -2391,8 +2311,8 @@
         </p:nvSpPr>
         <p:spPr>
           <a:xfrm>
-            <a:off x="5183188" y="987425"/>
-            <a:ext cx="6172200" cy="4873625"/>
+            <a:off x="3887391" y="987426"/>
+            <a:ext cx="4629150" cy="4873625"/>
           </a:xfrm>
         </p:spPr>
         <p:txBody>
@@ -2460,7 +2380,7 @@
               <a:rPr lang="en-US" smtClean="0"/>
               <a:t>Fifth level</a:t>
             </a:r>
-            <a:endParaRPr lang="pt-PT"/>
+            <a:endParaRPr lang="en-US" dirty="0"/>
           </a:p>
         </p:txBody>
       </p:sp>
@@ -2476,8 +2396,8 @@
         </p:nvSpPr>
         <p:spPr>
           <a:xfrm>
-            <a:off x="839788" y="2057400"/>
-            <a:ext cx="3932237" cy="3811588"/>
+            <a:off x="629841" y="2057400"/>
+            <a:ext cx="2949178" cy="3811588"/>
           </a:xfrm>
         </p:spPr>
         <p:txBody>
@@ -2546,7 +2466,7 @@
           <a:p>
             <a:fld id="{8635A13E-CC1A-4EBE-9635-2354845B9288}" type="datetimeFigureOut">
               <a:rPr lang="pt-PT" smtClean="0"/>
-              <a:t>06/09/2021</a:t>
+              <a:t>09/09/2021</a:t>
             </a:fld>
             <a:endParaRPr lang="pt-PT"/>
           </a:p>
@@ -2597,7 +2517,7 @@
     </p:spTree>
     <p:extLst>
       <p:ext uri="{BB962C8B-B14F-4D97-AF65-F5344CB8AC3E}">
-        <p14:creationId xmlns:p14="http://schemas.microsoft.com/office/powerpoint/2010/main" val="3033915461"/>
+        <p14:creationId xmlns:p14="http://schemas.microsoft.com/office/powerpoint/2010/main" val="3292744819"/>
       </p:ext>
     </p:extLst>
   </p:cSld>
@@ -2636,8 +2556,8 @@
         </p:nvSpPr>
         <p:spPr>
           <a:xfrm>
-            <a:off x="839788" y="457200"/>
-            <a:ext cx="3932237" cy="1600200"/>
+            <a:off x="629841" y="457200"/>
+            <a:ext cx="2949178" cy="1600200"/>
           </a:xfrm>
         </p:spPr>
         <p:txBody>
@@ -2652,7 +2572,7 @@
               <a:rPr lang="en-US" smtClean="0"/>
               <a:t>Click to edit Master title style</a:t>
             </a:r>
-            <a:endParaRPr lang="pt-PT"/>
+            <a:endParaRPr lang="en-US" dirty="0"/>
           </a:p>
         </p:txBody>
       </p:sp>
@@ -2660,7 +2580,7 @@
         <p:nvSpPr>
           <p:cNvPr id="3" name="Picture Placeholder 2"/>
           <p:cNvSpPr>
-            <a:spLocks noGrp="1"/>
+            <a:spLocks noGrp="1" noChangeAspect="1"/>
           </p:cNvSpPr>
           <p:nvPr>
             <p:ph type="pic" idx="1"/>
@@ -2668,12 +2588,12 @@
         </p:nvSpPr>
         <p:spPr>
           <a:xfrm>
-            <a:off x="5183188" y="987425"/>
-            <a:ext cx="6172200" cy="4873625"/>
-          </a:xfrm>
-        </p:spPr>
-        <p:txBody>
-          <a:bodyPr/>
+            <a:off x="3887391" y="987426"/>
+            <a:ext cx="4629150" cy="4873625"/>
+          </a:xfrm>
+        </p:spPr>
+        <p:txBody>
+          <a:bodyPr anchor="t"/>
           <a:lstStyle>
             <a:lvl1pPr marL="0" indent="0">
               <a:buNone/>
@@ -2713,7 +2633,11 @@
             </a:lvl9pPr>
           </a:lstStyle>
           <a:p>
-            <a:endParaRPr lang="pt-PT"/>
+            <a:r>
+              <a:rPr lang="en-US" smtClean="0"/>
+              <a:t>Click icon to add picture</a:t>
+            </a:r>
+            <a:endParaRPr lang="en-US" dirty="0"/>
           </a:p>
         </p:txBody>
       </p:sp>
@@ -2729,8 +2653,8 @@
         </p:nvSpPr>
         <p:spPr>
           <a:xfrm>
-            <a:off x="839788" y="2057400"/>
-            <a:ext cx="3932237" cy="3811588"/>
+            <a:off x="629841" y="2057400"/>
+            <a:ext cx="2949178" cy="3811588"/>
           </a:xfrm>
         </p:spPr>
         <p:txBody>
@@ -2799,7 +2723,7 @@
           <a:p>
             <a:fld id="{8635A13E-CC1A-4EBE-9635-2354845B9288}" type="datetimeFigureOut">
               <a:rPr lang="pt-PT" smtClean="0"/>
-              <a:t>06/09/2021</a:t>
+              <a:t>09/09/2021</a:t>
             </a:fld>
             <a:endParaRPr lang="pt-PT"/>
           </a:p>
@@ -2850,7 +2774,7 @@
     </p:spTree>
     <p:extLst>
       <p:ext uri="{BB962C8B-B14F-4D97-AF65-F5344CB8AC3E}">
-        <p14:creationId xmlns:p14="http://schemas.microsoft.com/office/powerpoint/2010/main" val="3919325617"/>
+        <p14:creationId xmlns:p14="http://schemas.microsoft.com/office/powerpoint/2010/main" val="3139449281"/>
       </p:ext>
     </p:extLst>
   </p:cSld>
@@ -2894,8 +2818,8 @@
         </p:nvSpPr>
         <p:spPr>
           <a:xfrm>
-            <a:off x="838200" y="365125"/>
-            <a:ext cx="10515600" cy="1325563"/>
+            <a:off x="628650" y="365126"/>
+            <a:ext cx="7886700" cy="1325563"/>
           </a:xfrm>
           <a:prstGeom prst="rect">
             <a:avLst/>
@@ -2911,7 +2835,7 @@
               <a:rPr lang="en-US" smtClean="0"/>
               <a:t>Click to edit Master title style</a:t>
             </a:r>
-            <a:endParaRPr lang="pt-PT"/>
+            <a:endParaRPr lang="en-US" dirty="0"/>
           </a:p>
         </p:txBody>
       </p:sp>
@@ -2927,8 +2851,8 @@
         </p:nvSpPr>
         <p:spPr>
           <a:xfrm>
-            <a:off x="838200" y="1825625"/>
-            <a:ext cx="10515600" cy="4351338"/>
+            <a:off x="628650" y="1825625"/>
+            <a:ext cx="7886700" cy="4351338"/>
           </a:xfrm>
           <a:prstGeom prst="rect">
             <a:avLst/>
@@ -2973,7 +2897,7 @@
               <a:rPr lang="en-US" smtClean="0"/>
               <a:t>Fifth level</a:t>
             </a:r>
-            <a:endParaRPr lang="pt-PT"/>
+            <a:endParaRPr lang="en-US" dirty="0"/>
           </a:p>
         </p:txBody>
       </p:sp>
@@ -2989,8 +2913,8 @@
         </p:nvSpPr>
         <p:spPr>
           <a:xfrm>
-            <a:off x="838200" y="6356350"/>
-            <a:ext cx="2743200" cy="365125"/>
+            <a:off x="628650" y="6356351"/>
+            <a:ext cx="2057400" cy="365125"/>
           </a:xfrm>
           <a:prstGeom prst="rect">
             <a:avLst/>
@@ -3012,7 +2936,7 @@
           <a:p>
             <a:fld id="{8635A13E-CC1A-4EBE-9635-2354845B9288}" type="datetimeFigureOut">
               <a:rPr lang="pt-PT" smtClean="0"/>
-              <a:t>06/09/2021</a:t>
+              <a:t>09/09/2021</a:t>
             </a:fld>
             <a:endParaRPr lang="pt-PT"/>
           </a:p>
@@ -3030,8 +2954,8 @@
         </p:nvSpPr>
         <p:spPr>
           <a:xfrm>
-            <a:off x="4038600" y="6356350"/>
-            <a:ext cx="4114800" cy="365125"/>
+            <a:off x="3028950" y="6356351"/>
+            <a:ext cx="3086100" cy="365125"/>
           </a:xfrm>
           <a:prstGeom prst="rect">
             <a:avLst/>
@@ -3067,8 +2991,8 @@
         </p:nvSpPr>
         <p:spPr>
           <a:xfrm>
-            <a:off x="8610600" y="6356350"/>
-            <a:ext cx="2743200" cy="365125"/>
+            <a:off x="6457950" y="6356351"/>
+            <a:ext cx="2057400" cy="365125"/>
           </a:xfrm>
           <a:prstGeom prst="rect">
             <a:avLst/>
@@ -3099,23 +3023,23 @@
     </p:spTree>
     <p:extLst>
       <p:ext uri="{BB962C8B-B14F-4D97-AF65-F5344CB8AC3E}">
-        <p14:creationId xmlns:p14="http://schemas.microsoft.com/office/powerpoint/2010/main" val="3031496283"/>
+        <p14:creationId xmlns:p14="http://schemas.microsoft.com/office/powerpoint/2010/main" val="3460004726"/>
       </p:ext>
     </p:extLst>
   </p:cSld>
   <p:clrMap bg1="lt1" tx1="dk1" bg2="lt2" tx2="dk2" accent1="accent1" accent2="accent2" accent3="accent3" accent4="accent4" accent5="accent5" accent6="accent6" hlink="hlink" folHlink="folHlink"/>
   <p:sldLayoutIdLst>
-    <p:sldLayoutId id="2147483649" r:id="rId1"/>
-    <p:sldLayoutId id="2147483650" r:id="rId2"/>
-    <p:sldLayoutId id="2147483651" r:id="rId3"/>
-    <p:sldLayoutId id="2147483652" r:id="rId4"/>
-    <p:sldLayoutId id="2147483653" r:id="rId5"/>
-    <p:sldLayoutId id="2147483654" r:id="rId6"/>
-    <p:sldLayoutId id="2147483655" r:id="rId7"/>
-    <p:sldLayoutId id="2147483656" r:id="rId8"/>
-    <p:sldLayoutId id="2147483657" r:id="rId9"/>
-    <p:sldLayoutId id="2147483658" r:id="rId10"/>
-    <p:sldLayoutId id="2147483659" r:id="rId11"/>
+    <p:sldLayoutId id="2147483661" r:id="rId1"/>
+    <p:sldLayoutId id="2147483662" r:id="rId2"/>
+    <p:sldLayoutId id="2147483663" r:id="rId3"/>
+    <p:sldLayoutId id="2147483664" r:id="rId4"/>
+    <p:sldLayoutId id="2147483665" r:id="rId5"/>
+    <p:sldLayoutId id="2147483666" r:id="rId6"/>
+    <p:sldLayoutId id="2147483667" r:id="rId7"/>
+    <p:sldLayoutId id="2147483668" r:id="rId8"/>
+    <p:sldLayoutId id="2147483669" r:id="rId9"/>
+    <p:sldLayoutId id="2147483670" r:id="rId10"/>
+    <p:sldLayoutId id="2147483671" r:id="rId11"/>
   </p:sldLayoutIdLst>
   <p:txStyles>
     <p:titleStyle>
@@ -3303,7 +3227,7 @@
     </p:bodyStyle>
     <p:otherStyle>
       <a:defPPr>
-        <a:defRPr lang="pt-PT"/>
+        <a:defRPr lang="en-US"/>
       </a:defPPr>
       <a:lvl1pPr marL="0" algn="l" defTabSz="914400" rtl="0" eaLnBrk="1" latinLnBrk="0" hangingPunct="1">
         <a:defRPr sz="1800" kern="1200">
@@ -3417,29 +3341,6 @@
           <a:chExt cx="0" cy="0"/>
         </a:xfrm>
       </p:grpSpPr>
-      <p:sp>
-        <p:nvSpPr>
-          <p:cNvPr id="2" name="Title 1"/>
-          <p:cNvSpPr>
-            <a:spLocks noGrp="1"/>
-          </p:cNvSpPr>
-          <p:nvPr>
-            <p:ph type="title"/>
-          </p:nvPr>
-        </p:nvSpPr>
-        <p:spPr/>
-        <p:txBody>
-          <a:bodyPr/>
-          <a:lstStyle/>
-          <a:p>
-            <a:r>
-              <a:rPr lang="pt-PT" dirty="0" smtClean="0"/>
-              <a:t>SETUP</a:t>
-            </a:r>
-            <a:endParaRPr lang="pt-PT" dirty="0"/>
-          </a:p>
-        </p:txBody>
-      </p:sp>
       <p:pic>
         <p:nvPicPr>
           <p:cNvPr id="3" name="Picture 2"/>
@@ -3456,24 +3357,117 @@
         </p:blipFill>
         <p:spPr>
           <a:xfrm>
-            <a:off x="1268083" y="742625"/>
-            <a:ext cx="10787950" cy="6006520"/>
+            <a:off x="-287381" y="-134996"/>
+            <a:ext cx="10713118" cy="7252258"/>
           </a:xfrm>
           <a:prstGeom prst="rect">
             <a:avLst/>
           </a:prstGeom>
         </p:spPr>
       </p:pic>
+      <p:sp>
+        <p:nvSpPr>
+          <p:cNvPr id="2" name="Title 1"/>
+          <p:cNvSpPr>
+            <a:spLocks noGrp="1"/>
+          </p:cNvSpPr>
+          <p:nvPr>
+            <p:ph type="title"/>
+          </p:nvPr>
+        </p:nvSpPr>
+        <p:spPr>
+          <a:xfrm>
+            <a:off x="1011827" y="-134996"/>
+            <a:ext cx="7886700" cy="1325563"/>
+          </a:xfrm>
+        </p:spPr>
+        <p:txBody>
+          <a:bodyPr/>
+          <a:lstStyle/>
+          <a:p>
+            <a:r>
+              <a:rPr lang="pt-PT" dirty="0" smtClean="0"/>
+              <a:t>Demo 1</a:t>
+            </a:r>
+            <a:endParaRPr lang="pt-PT" dirty="0"/>
+          </a:p>
+        </p:txBody>
+      </p:sp>
+      <p:pic>
+        <p:nvPicPr>
+          <p:cNvPr id="4" name="Picture 3"/>
+          <p:cNvPicPr>
+            <a:picLocks noChangeAspect="1"/>
+          </p:cNvPicPr>
+          <p:nvPr/>
+        </p:nvPicPr>
+        <p:blipFill>
+          <a:blip r:embed="rId3"/>
+          <a:stretch>
+            <a:fillRect/>
+          </a:stretch>
+        </p:blipFill>
+        <p:spPr>
+          <a:xfrm>
+            <a:off x="134900" y="1191740"/>
+            <a:ext cx="8878850" cy="4581368"/>
+          </a:xfrm>
+          <a:prstGeom prst="rect">
+            <a:avLst/>
+          </a:prstGeom>
+        </p:spPr>
+      </p:pic>
+      <p:sp>
+        <p:nvSpPr>
+          <p:cNvPr id="5" name="TextBox 4"/>
+          <p:cNvSpPr txBox="1"/>
+          <p:nvPr/>
+        </p:nvSpPr>
+        <p:spPr>
+          <a:xfrm>
+            <a:off x="1861793" y="6383383"/>
+            <a:ext cx="6414769" cy="369332"/>
+          </a:xfrm>
+          <a:prstGeom prst="rect">
+            <a:avLst/>
+          </a:prstGeom>
+          <a:noFill/>
+        </p:spPr>
+        <p:txBody>
+          <a:bodyPr wrap="none" rtlCol="0">
+            <a:spAutoFit/>
+          </a:bodyPr>
+          <a:lstStyle/>
+          <a:p>
+            <a:r>
+              <a:rPr lang="pt-PT" dirty="0"/>
+              <a:t>Repository: </a:t>
+            </a:r>
+            <a:r>
+              <a:rPr lang="pt-PT" dirty="0" smtClean="0"/>
+              <a:t>github.com/vitormorais/SummerSchool_PowerQuality</a:t>
+            </a:r>
+            <a:endParaRPr lang="pt-PT" dirty="0"/>
+          </a:p>
+        </p:txBody>
+      </p:sp>
     </p:spTree>
     <p:extLst>
       <p:ext uri="{BB962C8B-B14F-4D97-AF65-F5344CB8AC3E}">
-        <p14:creationId xmlns:p14="http://schemas.microsoft.com/office/powerpoint/2010/main" val="3368834563"/>
+        <p14:creationId xmlns:p14="http://schemas.microsoft.com/office/powerpoint/2010/main" val="428236280"/>
       </p:ext>
     </p:extLst>
   </p:cSld>
   <p:clrMapOvr>
     <a:masterClrMapping/>
   </p:clrMapOvr>
+  <p:timing>
+    <p:tnLst>
+      <p:par>
+        <p:cTn id="1" dur="indefinite" restart="never" nodeType="tmRoot"/>
+      </p:par>
+    </p:tnLst>
+  </p:timing>
 </p:sld>
 </file>
 
@@ -3494,32 +3488,9 @@
           <a:chExt cx="0" cy="0"/>
         </a:xfrm>
       </p:grpSpPr>
-      <p:sp>
-        <p:nvSpPr>
-          <p:cNvPr id="6" name="Title 5"/>
-          <p:cNvSpPr>
-            <a:spLocks noGrp="1"/>
-          </p:cNvSpPr>
-          <p:nvPr>
-            <p:ph type="title"/>
-          </p:nvPr>
-        </p:nvSpPr>
-        <p:spPr/>
-        <p:txBody>
-          <a:bodyPr/>
-          <a:lstStyle/>
-          <a:p>
-            <a:r>
-              <a:rPr lang="pt-PT" dirty="0" smtClean="0"/>
-              <a:t>DEMO1</a:t>
-            </a:r>
-            <a:endParaRPr lang="pt-PT" dirty="0"/>
-          </a:p>
-        </p:txBody>
-      </p:sp>
       <p:pic>
         <p:nvPicPr>
-          <p:cNvPr id="7" name="Picture 6"/>
+          <p:cNvPr id="3" name="Picture 2"/>
           <p:cNvPicPr>
             <a:picLocks noChangeAspect="1"/>
           </p:cNvPicPr>
@@ -3533,24 +3504,153 @@
         </p:blipFill>
         <p:spPr>
           <a:xfrm>
-            <a:off x="2293619" y="1966779"/>
-            <a:ext cx="7263743" cy="3930282"/>
+            <a:off x="-287381" y="-134996"/>
+            <a:ext cx="10713118" cy="7252258"/>
           </a:xfrm>
           <a:prstGeom prst="rect">
             <a:avLst/>
           </a:prstGeom>
         </p:spPr>
       </p:pic>
+      <p:sp>
+        <p:nvSpPr>
+          <p:cNvPr id="2" name="Title 1"/>
+          <p:cNvSpPr>
+            <a:spLocks noGrp="1"/>
+          </p:cNvSpPr>
+          <p:nvPr>
+            <p:ph type="title"/>
+          </p:nvPr>
+        </p:nvSpPr>
+        <p:spPr>
+          <a:xfrm>
+            <a:off x="1011827" y="-134996"/>
+            <a:ext cx="7886700" cy="1325563"/>
+          </a:xfrm>
+        </p:spPr>
+        <p:txBody>
+          <a:bodyPr/>
+          <a:lstStyle/>
+          <a:p>
+            <a:r>
+              <a:rPr lang="pt-PT" dirty="0" smtClean="0"/>
+              <a:t>Demo 1: Objectives</a:t>
+            </a:r>
+            <a:endParaRPr lang="pt-PT" dirty="0"/>
+          </a:p>
+        </p:txBody>
+      </p:sp>
+      <p:sp>
+        <p:nvSpPr>
+          <p:cNvPr id="4" name="TextBox 3"/>
+          <p:cNvSpPr txBox="1"/>
+          <p:nvPr/>
+        </p:nvSpPr>
+        <p:spPr>
+          <a:xfrm>
+            <a:off x="1236617" y="1924594"/>
+            <a:ext cx="5867440" cy="1815882"/>
+          </a:xfrm>
+          <a:prstGeom prst="rect">
+            <a:avLst/>
+          </a:prstGeom>
+          <a:noFill/>
+        </p:spPr>
+        <p:txBody>
+          <a:bodyPr wrap="none" rtlCol="0">
+            <a:spAutoFit/>
+          </a:bodyPr>
+          <a:lstStyle/>
+          <a:p>
+            <a:pPr marL="342900" indent="-342900">
+              <a:buAutoNum type="arabicPeriod"/>
+            </a:pPr>
+            <a:r>
+              <a:rPr lang="pt-PT" sz="2800" dirty="0" smtClean="0"/>
+              <a:t>Acquire measurement: grid voltage</a:t>
+            </a:r>
+          </a:p>
+          <a:p>
+            <a:pPr marL="342900" indent="-342900">
+              <a:buAutoNum type="arabicPeriod"/>
+            </a:pPr>
+            <a:r>
+              <a:rPr lang="pt-PT" sz="2800" dirty="0" smtClean="0"/>
+              <a:t>Load measurement to MatLab</a:t>
+            </a:r>
+          </a:p>
+          <a:p>
+            <a:pPr marL="342900" indent="-342900">
+              <a:buAutoNum type="arabicPeriod"/>
+            </a:pPr>
+            <a:r>
+              <a:rPr lang="pt-PT" sz="2800" dirty="0" smtClean="0"/>
+              <a:t>Perform Power Quality Analysis</a:t>
+            </a:r>
+          </a:p>
+          <a:p>
+            <a:pPr marL="342900" indent="-342900">
+              <a:buAutoNum type="arabicPeriod"/>
+            </a:pPr>
+            <a:r>
+              <a:rPr lang="pt-PT" sz="2800" dirty="0" smtClean="0"/>
+              <a:t>Assessment of EN 50160 compliance</a:t>
+            </a:r>
+            <a:endParaRPr lang="pt-PT" sz="2800" dirty="0"/>
+          </a:p>
+        </p:txBody>
+      </p:sp>
+      <p:sp>
+        <p:nvSpPr>
+          <p:cNvPr id="5" name="TextBox 4"/>
+          <p:cNvSpPr txBox="1"/>
+          <p:nvPr/>
+        </p:nvSpPr>
+        <p:spPr>
+          <a:xfrm>
+            <a:off x="1861793" y="6383383"/>
+            <a:ext cx="6414769" cy="369332"/>
+          </a:xfrm>
+          <a:prstGeom prst="rect">
+            <a:avLst/>
+          </a:prstGeom>
+          <a:noFill/>
+        </p:spPr>
+        <p:txBody>
+          <a:bodyPr wrap="none" rtlCol="0">
+            <a:spAutoFit/>
+          </a:bodyPr>
+          <a:lstStyle/>
+          <a:p>
+            <a:r>
+              <a:rPr lang="pt-PT" dirty="0"/>
+              <a:t>Repository: </a:t>
+            </a:r>
+            <a:r>
+              <a:rPr lang="pt-PT" dirty="0" smtClean="0"/>
+              <a:t>github.com/vitormorais/SummerSchool_PowerQuality</a:t>
+            </a:r>
+            <a:endParaRPr lang="pt-PT" dirty="0"/>
+          </a:p>
+        </p:txBody>
+      </p:sp>
     </p:spTree>
     <p:extLst>
       <p:ext uri="{BB962C8B-B14F-4D97-AF65-F5344CB8AC3E}">
-        <p14:creationId xmlns:p14="http://schemas.microsoft.com/office/powerpoint/2010/main" val="424849101"/>
+        <p14:creationId xmlns:p14="http://schemas.microsoft.com/office/powerpoint/2010/main" val="934292061"/>
       </p:ext>
     </p:extLst>
   </p:cSld>
   <p:clrMapOvr>
     <a:masterClrMapping/>
   </p:clrMapOvr>
+  <p:timing>
+    <p:tnLst>
+      <p:par>
+        <p:cTn id="1" dur="indefinite" restart="never" nodeType="tmRoot"/>
+      </p:par>
+    </p:tnLst>
+  </p:timing>
 </p:sld>
 </file>
 
@@ -3573,7 +3673,7 @@
       </p:grpSpPr>
       <p:pic>
         <p:nvPicPr>
-          <p:cNvPr id="5" name="Picture 4"/>
+          <p:cNvPr id="3" name="Picture 2"/>
           <p:cNvPicPr>
             <a:picLocks noChangeAspect="1"/>
           </p:cNvPicPr>
@@ -3587,8 +3687,8 @@
         </p:blipFill>
         <p:spPr>
           <a:xfrm>
-            <a:off x="2293619" y="1966779"/>
-            <a:ext cx="6492242" cy="3930282"/>
+            <a:off x="-287381" y="-134996"/>
+            <a:ext cx="10713118" cy="7252258"/>
           </a:xfrm>
           <a:prstGeom prst="rect">
             <a:avLst/>
@@ -3597,7 +3697,7 @@
       </p:pic>
       <p:sp>
         <p:nvSpPr>
-          <p:cNvPr id="6" name="Title 5"/>
+          <p:cNvPr id="2" name="Title 1"/>
           <p:cNvSpPr>
             <a:spLocks noGrp="1"/>
           </p:cNvSpPr>
@@ -3605,14 +3705,77 @@
             <p:ph type="title"/>
           </p:nvPr>
         </p:nvSpPr>
-        <p:spPr/>
+        <p:spPr>
+          <a:xfrm>
+            <a:off x="1011827" y="-134996"/>
+            <a:ext cx="7886700" cy="1325563"/>
+          </a:xfrm>
+        </p:spPr>
         <p:txBody>
           <a:bodyPr/>
           <a:lstStyle/>
           <a:p>
             <a:r>
               <a:rPr lang="pt-PT" dirty="0" smtClean="0"/>
-              <a:t>DEMO2</a:t>
+              <a:t>Demo 2</a:t>
+            </a:r>
+            <a:endParaRPr lang="pt-PT" dirty="0"/>
+          </a:p>
+        </p:txBody>
+      </p:sp>
+      <p:pic>
+        <p:nvPicPr>
+          <p:cNvPr id="5" name="Picture 4"/>
+          <p:cNvPicPr>
+            <a:picLocks noChangeAspect="1"/>
+          </p:cNvPicPr>
+          <p:nvPr/>
+        </p:nvPicPr>
+        <p:blipFill>
+          <a:blip r:embed="rId3"/>
+          <a:stretch>
+            <a:fillRect/>
+          </a:stretch>
+        </p:blipFill>
+        <p:spPr>
+          <a:xfrm>
+            <a:off x="134901" y="1190567"/>
+            <a:ext cx="8878850" cy="4581369"/>
+          </a:xfrm>
+          <a:prstGeom prst="rect">
+            <a:avLst/>
+          </a:prstGeom>
+        </p:spPr>
+      </p:pic>
+      <p:sp>
+        <p:nvSpPr>
+          <p:cNvPr id="6" name="TextBox 5"/>
+          <p:cNvSpPr txBox="1"/>
+          <p:nvPr/>
+        </p:nvSpPr>
+        <p:spPr>
+          <a:xfrm>
+            <a:off x="1861793" y="6383383"/>
+            <a:ext cx="6414769" cy="369332"/>
+          </a:xfrm>
+          <a:prstGeom prst="rect">
+            <a:avLst/>
+          </a:prstGeom>
+          <a:noFill/>
+        </p:spPr>
+        <p:txBody>
+          <a:bodyPr wrap="none" rtlCol="0">
+            <a:spAutoFit/>
+          </a:bodyPr>
+          <a:lstStyle/>
+          <a:p>
+            <a:r>
+              <a:rPr lang="pt-PT" dirty="0"/>
+              <a:t>Repository: </a:t>
+            </a:r>
+            <a:r>
+              <a:rPr lang="pt-PT" dirty="0" smtClean="0"/>
+              <a:t>github.com/vitormorais/SummerSchool_PowerQuality</a:t>
             </a:r>
             <a:endParaRPr lang="pt-PT" dirty="0"/>
           </a:p>
@@ -3621,13 +3784,20 @@
     </p:spTree>
     <p:extLst>
       <p:ext uri="{BB962C8B-B14F-4D97-AF65-F5344CB8AC3E}">
-        <p14:creationId xmlns:p14="http://schemas.microsoft.com/office/powerpoint/2010/main" val="2427140305"/>
+        <p14:creationId xmlns:p14="http://schemas.microsoft.com/office/powerpoint/2010/main" val="4253229661"/>
       </p:ext>
     </p:extLst>
   </p:cSld>
   <p:clrMapOvr>
     <a:masterClrMapping/>
   </p:clrMapOvr>
+  <p:timing>
+    <p:tnLst>
+      <p:par>
+        <p:cTn id="1" dur="indefinite" restart="never" nodeType="tmRoot"/>
+      </p:par>
+    </p:tnLst>
+  </p:timing>
 </p:sld>
 </file>
 
@@ -3648,32 +3818,235 @@
           <a:chExt cx="0" cy="0"/>
         </a:xfrm>
       </p:grpSpPr>
-      <p:sp>
-        <p:nvSpPr>
-          <p:cNvPr id="6" name="Title 5"/>
-          <p:cNvSpPr>
-            <a:spLocks noGrp="1"/>
-          </p:cNvSpPr>
-          <p:nvPr>
-            <p:ph type="title"/>
-          </p:nvPr>
-        </p:nvSpPr>
-        <p:spPr/>
-        <p:txBody>
-          <a:bodyPr/>
-          <a:lstStyle/>
-          <a:p>
-            <a:r>
-              <a:rPr lang="pt-PT" dirty="0" smtClean="0"/>
-              <a:t>DEMO3</a:t>
-            </a:r>
-            <a:endParaRPr lang="pt-PT" dirty="0"/>
-          </a:p>
-        </p:txBody>
-      </p:sp>
       <p:pic>
         <p:nvPicPr>
-          <p:cNvPr id="2" name="Picture 1"/>
+          <p:cNvPr id="3" name="Picture 2"/>
+          <p:cNvPicPr>
+            <a:picLocks noChangeAspect="1"/>
+          </p:cNvPicPr>
+          <p:nvPr/>
+        </p:nvPicPr>
+        <p:blipFill>
+          <a:blip r:embed="rId2"/>
+          <a:stretch>
+            <a:fillRect/>
+          </a:stretch>
+        </p:blipFill>
+        <p:spPr>
+          <a:xfrm>
+            <a:off x="-287381" y="-134996"/>
+            <a:ext cx="10713118" cy="7252258"/>
+          </a:xfrm>
+          <a:prstGeom prst="rect">
+            <a:avLst/>
+          </a:prstGeom>
+        </p:spPr>
+      </p:pic>
+      <p:sp>
+        <p:nvSpPr>
+          <p:cNvPr id="2" name="Title 1"/>
+          <p:cNvSpPr>
+            <a:spLocks noGrp="1"/>
+          </p:cNvSpPr>
+          <p:nvPr>
+            <p:ph type="title"/>
+          </p:nvPr>
+        </p:nvSpPr>
+        <p:spPr>
+          <a:xfrm>
+            <a:off x="1011827" y="-134996"/>
+            <a:ext cx="7886700" cy="1325563"/>
+          </a:xfrm>
+        </p:spPr>
+        <p:txBody>
+          <a:bodyPr/>
+          <a:lstStyle/>
+          <a:p>
+            <a:r>
+              <a:rPr lang="pt-PT" dirty="0" smtClean="0"/>
+              <a:t>Demo 2: Objectives</a:t>
+            </a:r>
+            <a:endParaRPr lang="pt-PT" dirty="0"/>
+          </a:p>
+        </p:txBody>
+      </p:sp>
+      <p:sp>
+        <p:nvSpPr>
+          <p:cNvPr id="4" name="TextBox 3"/>
+          <p:cNvSpPr txBox="1"/>
+          <p:nvPr/>
+        </p:nvSpPr>
+        <p:spPr>
+          <a:xfrm>
+            <a:off x="1236617" y="1924594"/>
+            <a:ext cx="5662063" cy="1384995"/>
+          </a:xfrm>
+          <a:prstGeom prst="rect">
+            <a:avLst/>
+          </a:prstGeom>
+          <a:noFill/>
+        </p:spPr>
+        <p:txBody>
+          <a:bodyPr wrap="none" rtlCol="0">
+            <a:spAutoFit/>
+          </a:bodyPr>
+          <a:lstStyle/>
+          <a:p>
+            <a:pPr marL="342900" indent="-342900">
+              <a:buAutoNum type="arabicPeriod"/>
+            </a:pPr>
+            <a:r>
+              <a:rPr lang="pt-PT" sz="2800" dirty="0" smtClean="0"/>
+              <a:t>Acquire measurement: grid current</a:t>
+            </a:r>
+          </a:p>
+          <a:p>
+            <a:pPr marL="342900" indent="-342900">
+              <a:buAutoNum type="arabicPeriod"/>
+            </a:pPr>
+            <a:r>
+              <a:rPr lang="pt-PT" sz="2800" dirty="0" smtClean="0"/>
+              <a:t>Load measurement to MatLab</a:t>
+            </a:r>
+          </a:p>
+          <a:p>
+            <a:pPr marL="342900" indent="-342900">
+              <a:buAutoNum type="arabicPeriod"/>
+            </a:pPr>
+            <a:r>
+              <a:rPr lang="pt-PT" sz="2800" dirty="0" smtClean="0"/>
+              <a:t>Perform Spectrum Analysis</a:t>
+            </a:r>
+            <a:endParaRPr lang="pt-PT" sz="2800" dirty="0"/>
+          </a:p>
+        </p:txBody>
+      </p:sp>
+      <p:sp>
+        <p:nvSpPr>
+          <p:cNvPr id="5" name="TextBox 4"/>
+          <p:cNvSpPr txBox="1"/>
+          <p:nvPr/>
+        </p:nvSpPr>
+        <p:spPr>
+          <a:xfrm>
+            <a:off x="1861793" y="6383383"/>
+            <a:ext cx="6414769" cy="369332"/>
+          </a:xfrm>
+          <a:prstGeom prst="rect">
+            <a:avLst/>
+          </a:prstGeom>
+          <a:noFill/>
+        </p:spPr>
+        <p:txBody>
+          <a:bodyPr wrap="none" rtlCol="0">
+            <a:spAutoFit/>
+          </a:bodyPr>
+          <a:lstStyle/>
+          <a:p>
+            <a:r>
+              <a:rPr lang="pt-PT" dirty="0"/>
+              <a:t>Repository: </a:t>
+            </a:r>
+            <a:r>
+              <a:rPr lang="pt-PT" dirty="0" smtClean="0"/>
+              <a:t>github.com/vitormorais/SummerSchool_PowerQuality</a:t>
+            </a:r>
+            <a:endParaRPr lang="pt-PT" dirty="0"/>
+          </a:p>
+        </p:txBody>
+      </p:sp>
+    </p:spTree>
+    <p:extLst>
+      <p:ext uri="{BB962C8B-B14F-4D97-AF65-F5344CB8AC3E}">
+        <p14:creationId xmlns:p14="http://schemas.microsoft.com/office/powerpoint/2010/main" val="1526956247"/>
+      </p:ext>
+    </p:extLst>
+  </p:cSld>
+  <p:clrMapOvr>
+    <a:masterClrMapping/>
+  </p:clrMapOvr>
+  <p:timing>
+    <p:tnLst>
+      <p:par>
+        <p:cTn id="1" dur="indefinite" restart="never" nodeType="tmRoot"/>
+      </p:par>
+    </p:tnLst>
+  </p:timing>
+</p:sld>
+</file>
+
+<file path=ppt/slides/slide5.xml><?xml version="1.0" encoding="utf-8"?>
+<p:sld xmlns:a="http://schemas.openxmlformats.org/drawingml/2006/main" xmlns:r="http://schemas.openxmlformats.org/officeDocument/2006/relationships" xmlns:p="http://schemas.openxmlformats.org/presentationml/2006/main">
+  <p:cSld>
+    <p:spTree>
+      <p:nvGrpSpPr>
+        <p:cNvPr id="1" name=""/>
+        <p:cNvGrpSpPr/>
+        <p:nvPr/>
+      </p:nvGrpSpPr>
+      <p:grpSpPr>
+        <a:xfrm>
+          <a:off x="0" y="0"/>
+          <a:ext cx="0" cy="0"/>
+          <a:chOff x="0" y="0"/>
+          <a:chExt cx="0" cy="0"/>
+        </a:xfrm>
+      </p:grpSpPr>
+      <p:pic>
+        <p:nvPicPr>
+          <p:cNvPr id="3" name="Picture 2"/>
+          <p:cNvPicPr>
+            <a:picLocks noChangeAspect="1"/>
+          </p:cNvPicPr>
+          <p:nvPr/>
+        </p:nvPicPr>
+        <p:blipFill>
+          <a:blip r:embed="rId2"/>
+          <a:stretch>
+            <a:fillRect/>
+          </a:stretch>
+        </p:blipFill>
+        <p:spPr>
+          <a:xfrm>
+            <a:off x="-287381" y="-134996"/>
+            <a:ext cx="10713118" cy="7252258"/>
+          </a:xfrm>
+          <a:prstGeom prst="rect">
+            <a:avLst/>
+          </a:prstGeom>
+        </p:spPr>
+      </p:pic>
+      <p:sp>
+        <p:nvSpPr>
+          <p:cNvPr id="2" name="Title 1"/>
+          <p:cNvSpPr>
+            <a:spLocks noGrp="1"/>
+          </p:cNvSpPr>
+          <p:nvPr>
+            <p:ph type="title"/>
+          </p:nvPr>
+        </p:nvSpPr>
+        <p:spPr>
+          <a:xfrm>
+            <a:off x="1011827" y="-134996"/>
+            <a:ext cx="7886700" cy="1325563"/>
+          </a:xfrm>
+        </p:spPr>
+        <p:txBody>
+          <a:bodyPr/>
+          <a:lstStyle/>
+          <a:p>
+            <a:r>
+              <a:rPr lang="pt-PT" dirty="0" smtClean="0"/>
+              <a:t>Demo 3</a:t>
+            </a:r>
+            <a:endParaRPr lang="pt-PT" dirty="0"/>
+          </a:p>
+        </p:txBody>
+      </p:sp>
+      <p:pic>
+        <p:nvPicPr>
+          <p:cNvPr id="4" name="Picture 3"/>
           <p:cNvPicPr>
             <a:picLocks noChangeAspect="1"/>
           </p:cNvPicPr>
@@ -3687,31 +4060,246 @@
         </p:blipFill>
         <p:spPr>
           <a:xfrm>
-            <a:off x="1565909" y="2017124"/>
-            <a:ext cx="9060181" cy="3920270"/>
+            <a:off x="134901" y="1190567"/>
+            <a:ext cx="8878851" cy="4581369"/>
           </a:xfrm>
           <a:prstGeom prst="rect">
             <a:avLst/>
           </a:prstGeom>
         </p:spPr>
       </p:pic>
+      <p:sp>
+        <p:nvSpPr>
+          <p:cNvPr id="6" name="TextBox 5"/>
+          <p:cNvSpPr txBox="1"/>
+          <p:nvPr/>
+        </p:nvSpPr>
+        <p:spPr>
+          <a:xfrm>
+            <a:off x="1861793" y="6383383"/>
+            <a:ext cx="6414769" cy="369332"/>
+          </a:xfrm>
+          <a:prstGeom prst="rect">
+            <a:avLst/>
+          </a:prstGeom>
+          <a:noFill/>
+        </p:spPr>
+        <p:txBody>
+          <a:bodyPr wrap="none" rtlCol="0">
+            <a:spAutoFit/>
+          </a:bodyPr>
+          <a:lstStyle/>
+          <a:p>
+            <a:r>
+              <a:rPr lang="pt-PT" dirty="0"/>
+              <a:t>Repository: </a:t>
+            </a:r>
+            <a:r>
+              <a:rPr lang="pt-PT" dirty="0" smtClean="0"/>
+              <a:t>github.com/vitormorais/SummerSchool_PowerQuality</a:t>
+            </a:r>
+            <a:endParaRPr lang="pt-PT" dirty="0"/>
+          </a:p>
+        </p:txBody>
+      </p:sp>
     </p:spTree>
     <p:extLst>
       <p:ext uri="{BB962C8B-B14F-4D97-AF65-F5344CB8AC3E}">
-        <p14:creationId xmlns:p14="http://schemas.microsoft.com/office/powerpoint/2010/main" val="3080996399"/>
+        <p14:creationId xmlns:p14="http://schemas.microsoft.com/office/powerpoint/2010/main" val="1768066607"/>
       </p:ext>
     </p:extLst>
   </p:cSld>
   <p:clrMapOvr>
     <a:masterClrMapping/>
   </p:clrMapOvr>
+  <p:timing>
+    <p:tnLst>
+      <p:par>
+        <p:cTn id="1" dur="indefinite" restart="never" nodeType="tmRoot"/>
+      </p:par>
+    </p:tnLst>
+  </p:timing>
+</p:sld>
+</file>
+
+<file path=ppt/slides/slide6.xml><?xml version="1.0" encoding="utf-8"?>
+<p:sld xmlns:a="http://schemas.openxmlformats.org/drawingml/2006/main" xmlns:r="http://schemas.openxmlformats.org/officeDocument/2006/relationships" xmlns:p="http://schemas.openxmlformats.org/presentationml/2006/main">
+  <p:cSld>
+    <p:spTree>
+      <p:nvGrpSpPr>
+        <p:cNvPr id="1" name=""/>
+        <p:cNvGrpSpPr/>
+        <p:nvPr/>
+      </p:nvGrpSpPr>
+      <p:grpSpPr>
+        <a:xfrm>
+          <a:off x="0" y="0"/>
+          <a:ext cx="0" cy="0"/>
+          <a:chOff x="0" y="0"/>
+          <a:chExt cx="0" cy="0"/>
+        </a:xfrm>
+      </p:grpSpPr>
+      <p:pic>
+        <p:nvPicPr>
+          <p:cNvPr id="3" name="Picture 2"/>
+          <p:cNvPicPr>
+            <a:picLocks noChangeAspect="1"/>
+          </p:cNvPicPr>
+          <p:nvPr/>
+        </p:nvPicPr>
+        <p:blipFill>
+          <a:blip r:embed="rId2"/>
+          <a:stretch>
+            <a:fillRect/>
+          </a:stretch>
+        </p:blipFill>
+        <p:spPr>
+          <a:xfrm>
+            <a:off x="-287381" y="-134996"/>
+            <a:ext cx="10713118" cy="7252258"/>
+          </a:xfrm>
+          <a:prstGeom prst="rect">
+            <a:avLst/>
+          </a:prstGeom>
+        </p:spPr>
+      </p:pic>
+      <p:sp>
+        <p:nvSpPr>
+          <p:cNvPr id="2" name="Title 1"/>
+          <p:cNvSpPr>
+            <a:spLocks noGrp="1"/>
+          </p:cNvSpPr>
+          <p:nvPr>
+            <p:ph type="title"/>
+          </p:nvPr>
+        </p:nvSpPr>
+        <p:spPr>
+          <a:xfrm>
+            <a:off x="1011827" y="-134996"/>
+            <a:ext cx="7886700" cy="1325563"/>
+          </a:xfrm>
+        </p:spPr>
+        <p:txBody>
+          <a:bodyPr/>
+          <a:lstStyle/>
+          <a:p>
+            <a:r>
+              <a:rPr lang="pt-PT" dirty="0" smtClean="0"/>
+              <a:t>Demo 3: Objectives</a:t>
+            </a:r>
+            <a:endParaRPr lang="pt-PT" dirty="0"/>
+          </a:p>
+        </p:txBody>
+      </p:sp>
+      <p:sp>
+        <p:nvSpPr>
+          <p:cNvPr id="4" name="TextBox 3"/>
+          <p:cNvSpPr txBox="1"/>
+          <p:nvPr/>
+        </p:nvSpPr>
+        <p:spPr>
+          <a:xfrm>
+            <a:off x="1236617" y="1924594"/>
+            <a:ext cx="6872907" cy="1384995"/>
+          </a:xfrm>
+          <a:prstGeom prst="rect">
+            <a:avLst/>
+          </a:prstGeom>
+          <a:noFill/>
+        </p:spPr>
+        <p:txBody>
+          <a:bodyPr wrap="none" rtlCol="0">
+            <a:spAutoFit/>
+          </a:bodyPr>
+          <a:lstStyle/>
+          <a:p>
+            <a:pPr marL="342900" indent="-342900">
+              <a:buAutoNum type="arabicPeriod"/>
+            </a:pPr>
+            <a:r>
+              <a:rPr lang="pt-PT" sz="2800" dirty="0" smtClean="0"/>
+              <a:t>Acquire measurement: 3p voltage + current</a:t>
+            </a:r>
+          </a:p>
+          <a:p>
+            <a:pPr marL="342900" indent="-342900">
+              <a:buAutoNum type="arabicPeriod"/>
+            </a:pPr>
+            <a:r>
+              <a:rPr lang="pt-PT" sz="2800" dirty="0" smtClean="0"/>
+              <a:t>Load measurement to MatLab</a:t>
+            </a:r>
+          </a:p>
+          <a:p>
+            <a:pPr marL="342900" indent="-342900">
+              <a:buAutoNum type="arabicPeriod"/>
+            </a:pPr>
+            <a:r>
+              <a:rPr lang="pt-PT" sz="2800" dirty="0" smtClean="0"/>
+              <a:t>Perform Spectrum Analysis</a:t>
+            </a:r>
+            <a:endParaRPr lang="pt-PT" sz="2800" dirty="0"/>
+          </a:p>
+        </p:txBody>
+      </p:sp>
+      <p:sp>
+        <p:nvSpPr>
+          <p:cNvPr id="5" name="TextBox 4"/>
+          <p:cNvSpPr txBox="1"/>
+          <p:nvPr/>
+        </p:nvSpPr>
+        <p:spPr>
+          <a:xfrm>
+            <a:off x="1861793" y="6383383"/>
+            <a:ext cx="6414769" cy="369332"/>
+          </a:xfrm>
+          <a:prstGeom prst="rect">
+            <a:avLst/>
+          </a:prstGeom>
+          <a:noFill/>
+        </p:spPr>
+        <p:txBody>
+          <a:bodyPr wrap="none" rtlCol="0">
+            <a:spAutoFit/>
+          </a:bodyPr>
+          <a:lstStyle/>
+          <a:p>
+            <a:r>
+              <a:rPr lang="pt-PT" dirty="0"/>
+              <a:t>Repository: </a:t>
+            </a:r>
+            <a:r>
+              <a:rPr lang="pt-PT" dirty="0" smtClean="0"/>
+              <a:t>github.com/vitormorais/SummerSchool_PowerQuality</a:t>
+            </a:r>
+            <a:endParaRPr lang="pt-PT" dirty="0"/>
+          </a:p>
+        </p:txBody>
+      </p:sp>
+    </p:spTree>
+    <p:extLst>
+      <p:ext uri="{BB962C8B-B14F-4D97-AF65-F5344CB8AC3E}">
+        <p14:creationId xmlns:p14="http://schemas.microsoft.com/office/powerpoint/2010/main" val="144011960"/>
+      </p:ext>
+    </p:extLst>
+  </p:cSld>
+  <p:clrMapOvr>
+    <a:masterClrMapping/>
+  </p:clrMapOvr>
+  <p:timing>
+    <p:tnLst>
+      <p:par>
+        <p:cTn id="1" dur="indefinite" restart="never" nodeType="tmRoot"/>
+      </p:par>
+    </p:tnLst>
+  </p:timing>
 </p:sld>
 </file>
 
 <file path=ppt/theme/theme1.xml><?xml version="1.0" encoding="utf-8"?>
 <a:theme xmlns:a="http://schemas.openxmlformats.org/drawingml/2006/main" name="Office Theme">
   <a:themeElements>
-    <a:clrScheme name="Office">
+    <a:clrScheme name="Office Theme">
       <a:dk1>
         <a:sysClr val="windowText" lastClr="000000"/>
       </a:dk1>
@@ -3749,7 +4337,7 @@
         <a:srgbClr val="954F72"/>
       </a:folHlink>
     </a:clrScheme>
-    <a:fontScheme name="Office">
+    <a:fontScheme name="Office Theme">
       <a:majorFont>
         <a:latin typeface="Calibri Light" panose="020F0302020204030204"/>
         <a:ea typeface=""/>
@@ -3821,7 +4409,7 @@
         <a:font script="Geor" typeface="Sylfaen"/>
       </a:minorFont>
     </a:fontScheme>
-    <a:fmtScheme name="Office">
+    <a:fmtScheme name="Office Theme">
       <a:fillStyleLst>
         <a:solidFill>
           <a:schemeClr val="phClr"/>

</xml_diff>